<commit_message>
Updated presentation and added correlation id
</commit_message>
<xml_diff>
--- a/Presentation/But It Was Logged.pptx
+++ b/Presentation/But It Was Logged.pptx
@@ -3017,8 +3017,13 @@
           <a:p>
             <a:r>
               <a:rPr lang="en-US" dirty="0"/>
-              <a:t>A practical look at logging with .NET Core</a:t>
-            </a:r>
+              <a:t>A practical look at logging with .</a:t>
+            </a:r>
+            <a:r>
+              <a:rPr lang="en-US"/>
+              <a:t>NET 5</a:t>
+            </a:r>
+            <a:endParaRPr lang="en-US" dirty="0"/>
           </a:p>
         </p:txBody>
       </p:sp>

</xml_diff>

<commit_message>
Updated with presentation changes
</commit_message>
<xml_diff>
--- a/Presentation/But It Was Logged.pptx
+++ b/Presentation/But It Was Logged.pptx
@@ -16,9 +16,9 @@
     <p:sldId id="267" r:id="rId10"/>
     <p:sldId id="268" r:id="rId11"/>
     <p:sldId id="265" r:id="rId12"/>
-    <p:sldId id="269" r:id="rId13"/>
-    <p:sldId id="270" r:id="rId14"/>
-    <p:sldId id="271" r:id="rId15"/>
+    <p:sldId id="271" r:id="rId13"/>
+    <p:sldId id="269" r:id="rId14"/>
+    <p:sldId id="270" r:id="rId15"/>
     <p:sldId id="261" r:id="rId16"/>
     <p:sldId id="266" r:id="rId17"/>
   </p:sldIdLst>
@@ -4162,6 +4162,389 @@
           <a:chExt cx="0" cy="0"/>
         </a:xfrm>
       </p:grpSpPr>
+      <p:sp>
+        <p:nvSpPr>
+          <p:cNvPr id="2" name="Title 1">
+            <a:extLst>
+              <a:ext uri="{FF2B5EF4-FFF2-40B4-BE49-F238E27FC236}">
+                <a16:creationId xmlns:a16="http://schemas.microsoft.com/office/drawing/2014/main" id="{E03281FC-7210-4ED9-9307-58A3CE63E058}"/>
+              </a:ext>
+            </a:extLst>
+          </p:cNvPr>
+          <p:cNvSpPr>
+            <a:spLocks noGrp="1"/>
+          </p:cNvSpPr>
+          <p:nvPr>
+            <p:ph type="title"/>
+          </p:nvPr>
+        </p:nvSpPr>
+        <p:spPr/>
+        <p:txBody>
+          <a:bodyPr/>
+          <a:lstStyle/>
+          <a:p>
+            <a:r>
+              <a:rPr lang="en-US" dirty="0"/>
+              <a:t>Message Format: </a:t>
+            </a:r>
+            <a:r>
+              <a:rPr lang="en-US" dirty="0" err="1"/>
+              <a:t>ToString</a:t>
+            </a:r>
+            <a:r>
+              <a:rPr lang="en-US" dirty="0"/>
+              <a:t>() vs Dump</a:t>
+            </a:r>
+          </a:p>
+        </p:txBody>
+      </p:sp>
+      <p:sp>
+        <p:nvSpPr>
+          <p:cNvPr id="3" name="Content Placeholder 2">
+            <a:extLst>
+              <a:ext uri="{FF2B5EF4-FFF2-40B4-BE49-F238E27FC236}">
+                <a16:creationId xmlns:a16="http://schemas.microsoft.com/office/drawing/2014/main" id="{820D962F-E825-4961-890B-5E3849C17450}"/>
+              </a:ext>
+            </a:extLst>
+          </p:cNvPr>
+          <p:cNvSpPr>
+            <a:spLocks noGrp="1"/>
+          </p:cNvSpPr>
+          <p:nvPr>
+            <p:ph idx="1"/>
+          </p:nvPr>
+        </p:nvSpPr>
+        <p:spPr/>
+        <p:txBody>
+          <a:bodyPr/>
+          <a:lstStyle/>
+          <a:p>
+            <a:r>
+              <a:rPr lang="fr-FR" dirty="0"/>
+              <a:t>_</a:t>
+            </a:r>
+            <a:r>
+              <a:rPr lang="fr-FR" dirty="0" err="1"/>
+              <a:t>logger.LogInformation</a:t>
+            </a:r>
+            <a:r>
+              <a:rPr lang="fr-FR" dirty="0"/>
+              <a:t>("User Information {User}", </a:t>
+            </a:r>
+            <a:r>
+              <a:rPr lang="fr-FR" dirty="0" err="1"/>
+              <a:t>Request</a:t>
+            </a:r>
+            <a:r>
+              <a:rPr lang="fr-FR" dirty="0"/>
+              <a:t>);</a:t>
+            </a:r>
+          </a:p>
+          <a:p>
+            <a:pPr lvl="1"/>
+            <a:r>
+              <a:rPr lang="fr-FR" dirty="0"/>
+              <a:t>[10:49:27 acd7bc9a-669d-4af5-9d4d-530b65966ef4 INF] User Information </a:t>
+            </a:r>
+            <a:r>
+              <a:rPr lang="fr-FR" dirty="0" err="1"/>
+              <a:t>Microsoft.AspNetCore.Http.DefaultHttpRequest</a:t>
+            </a:r>
+            <a:endParaRPr lang="fr-FR" dirty="0"/>
+          </a:p>
+          <a:p>
+            <a:r>
+              <a:rPr lang="en-US" dirty="0"/>
+              <a:t>_</a:t>
+            </a:r>
+            <a:r>
+              <a:rPr lang="en-US" dirty="0" err="1"/>
+              <a:t>logger.LogInformation</a:t>
+            </a:r>
+            <a:r>
+              <a:rPr lang="en-US" dirty="0"/>
+              <a:t>("Full User Identity Details {@User}", </a:t>
+            </a:r>
+            <a:r>
+              <a:rPr lang="en-US" dirty="0" err="1"/>
+              <a:t>User.Identity</a:t>
+            </a:r>
+            <a:r>
+              <a:rPr lang="en-US" dirty="0"/>
+              <a:t>);</a:t>
+            </a:r>
+          </a:p>
+          <a:p>
+            <a:pPr lvl="1"/>
+            <a:r>
+              <a:rPr lang="en-US" dirty="0"/>
+              <a:t>[10:49:27 acd7bc9a-669d-4af5-9d4d-530b65966ef4 INF] Full User Identity Details {"AuthenticationType":null,"IsAuthenticated":false,"Actor":null,"BootstrapContext":null,"Claims":[],"Label“….</a:t>
+            </a:r>
+          </a:p>
+        </p:txBody>
+      </p:sp>
+    </p:spTree>
+    <p:extLst>
+      <p:ext uri="{BB962C8B-B14F-4D97-AF65-F5344CB8AC3E}">
+        <p14:creationId xmlns:p14="http://schemas.microsoft.com/office/powerpoint/2010/main" val="2125271925"/>
+      </p:ext>
+    </p:extLst>
+  </p:cSld>
+  <p:clrMapOvr>
+    <a:masterClrMapping/>
+  </p:clrMapOvr>
+  <p:timing>
+    <p:tnLst>
+      <p:par>
+        <p:cTn id="1" dur="indefinite" restart="never" nodeType="tmRoot">
+          <p:childTnLst>
+            <p:seq concurrent="1" nextAc="seek">
+              <p:cTn id="2" dur="indefinite" nodeType="mainSeq">
+                <p:childTnLst>
+                  <p:par>
+                    <p:cTn id="3" fill="hold">
+                      <p:stCondLst>
+                        <p:cond delay="indefinite"/>
+                        <p:cond evt="onBegin" delay="0">
+                          <p:tn val="2"/>
+                        </p:cond>
+                      </p:stCondLst>
+                      <p:childTnLst>
+                        <p:par>
+                          <p:cTn id="4" fill="hold">
+                            <p:stCondLst>
+                              <p:cond delay="0"/>
+                            </p:stCondLst>
+                            <p:childTnLst>
+                              <p:par>
+                                <p:cTn id="5" presetID="1" presetClass="entr" presetSubtype="0" fill="hold" grpId="0" nodeType="withEffect">
+                                  <p:stCondLst>
+                                    <p:cond delay="0"/>
+                                  </p:stCondLst>
+                                  <p:childTnLst>
+                                    <p:set>
+                                      <p:cBhvr>
+                                        <p:cTn id="6" dur="1" fill="hold">
+                                          <p:stCondLst>
+                                            <p:cond delay="0"/>
+                                          </p:stCondLst>
+                                        </p:cTn>
+                                        <p:tgtEl>
+                                          <p:spTgt spid="3">
+                                            <p:txEl>
+                                              <p:pRg st="0" end="0"/>
+                                            </p:txEl>
+                                          </p:spTgt>
+                                        </p:tgtEl>
+                                        <p:attrNameLst>
+                                          <p:attrName>style.visibility</p:attrName>
+                                        </p:attrNameLst>
+                                      </p:cBhvr>
+                                      <p:to>
+                                        <p:strVal val="visible"/>
+                                      </p:to>
+                                    </p:set>
+                                  </p:childTnLst>
+                                </p:cTn>
+                              </p:par>
+                            </p:childTnLst>
+                          </p:cTn>
+                        </p:par>
+                      </p:childTnLst>
+                    </p:cTn>
+                  </p:par>
+                  <p:par>
+                    <p:cTn id="7" fill="hold">
+                      <p:stCondLst>
+                        <p:cond delay="indefinite"/>
+                      </p:stCondLst>
+                      <p:childTnLst>
+                        <p:par>
+                          <p:cTn id="8" fill="hold">
+                            <p:stCondLst>
+                              <p:cond delay="0"/>
+                            </p:stCondLst>
+                            <p:childTnLst>
+                              <p:par>
+                                <p:cTn id="9" presetID="1" presetClass="entr" presetSubtype="0" fill="hold" grpId="0" nodeType="clickEffect">
+                                  <p:stCondLst>
+                                    <p:cond delay="0"/>
+                                  </p:stCondLst>
+                                  <p:childTnLst>
+                                    <p:set>
+                                      <p:cBhvr>
+                                        <p:cTn id="10" dur="1" fill="hold">
+                                          <p:stCondLst>
+                                            <p:cond delay="0"/>
+                                          </p:stCondLst>
+                                        </p:cTn>
+                                        <p:tgtEl>
+                                          <p:spTgt spid="3">
+                                            <p:txEl>
+                                              <p:pRg st="1" end="1"/>
+                                            </p:txEl>
+                                          </p:spTgt>
+                                        </p:tgtEl>
+                                        <p:attrNameLst>
+                                          <p:attrName>style.visibility</p:attrName>
+                                        </p:attrNameLst>
+                                      </p:cBhvr>
+                                      <p:to>
+                                        <p:strVal val="visible"/>
+                                      </p:to>
+                                    </p:set>
+                                  </p:childTnLst>
+                                </p:cTn>
+                              </p:par>
+                            </p:childTnLst>
+                          </p:cTn>
+                        </p:par>
+                      </p:childTnLst>
+                    </p:cTn>
+                  </p:par>
+                  <p:par>
+                    <p:cTn id="11" fill="hold">
+                      <p:stCondLst>
+                        <p:cond delay="indefinite"/>
+                      </p:stCondLst>
+                      <p:childTnLst>
+                        <p:par>
+                          <p:cTn id="12" fill="hold">
+                            <p:stCondLst>
+                              <p:cond delay="0"/>
+                            </p:stCondLst>
+                            <p:childTnLst>
+                              <p:par>
+                                <p:cTn id="13" presetID="1" presetClass="entr" presetSubtype="0" fill="hold" grpId="0" nodeType="clickEffect">
+                                  <p:stCondLst>
+                                    <p:cond delay="0"/>
+                                  </p:stCondLst>
+                                  <p:childTnLst>
+                                    <p:set>
+                                      <p:cBhvr>
+                                        <p:cTn id="14" dur="1" fill="hold">
+                                          <p:stCondLst>
+                                            <p:cond delay="0"/>
+                                          </p:stCondLst>
+                                        </p:cTn>
+                                        <p:tgtEl>
+                                          <p:spTgt spid="3">
+                                            <p:txEl>
+                                              <p:pRg st="2" end="2"/>
+                                            </p:txEl>
+                                          </p:spTgt>
+                                        </p:tgtEl>
+                                        <p:attrNameLst>
+                                          <p:attrName>style.visibility</p:attrName>
+                                        </p:attrNameLst>
+                                      </p:cBhvr>
+                                      <p:to>
+                                        <p:strVal val="visible"/>
+                                      </p:to>
+                                    </p:set>
+                                  </p:childTnLst>
+                                </p:cTn>
+                              </p:par>
+                            </p:childTnLst>
+                          </p:cTn>
+                        </p:par>
+                      </p:childTnLst>
+                    </p:cTn>
+                  </p:par>
+                  <p:par>
+                    <p:cTn id="15" fill="hold">
+                      <p:stCondLst>
+                        <p:cond delay="indefinite"/>
+                      </p:stCondLst>
+                      <p:childTnLst>
+                        <p:par>
+                          <p:cTn id="16" fill="hold">
+                            <p:stCondLst>
+                              <p:cond delay="0"/>
+                            </p:stCondLst>
+                            <p:childTnLst>
+                              <p:par>
+                                <p:cTn id="17" presetID="1" presetClass="entr" presetSubtype="0" fill="hold" grpId="0" nodeType="clickEffect">
+                                  <p:stCondLst>
+                                    <p:cond delay="0"/>
+                                  </p:stCondLst>
+                                  <p:childTnLst>
+                                    <p:set>
+                                      <p:cBhvr>
+                                        <p:cTn id="18" dur="1" fill="hold">
+                                          <p:stCondLst>
+                                            <p:cond delay="0"/>
+                                          </p:stCondLst>
+                                        </p:cTn>
+                                        <p:tgtEl>
+                                          <p:spTgt spid="3">
+                                            <p:txEl>
+                                              <p:pRg st="3" end="3"/>
+                                            </p:txEl>
+                                          </p:spTgt>
+                                        </p:tgtEl>
+                                        <p:attrNameLst>
+                                          <p:attrName>style.visibility</p:attrName>
+                                        </p:attrNameLst>
+                                      </p:cBhvr>
+                                      <p:to>
+                                        <p:strVal val="visible"/>
+                                      </p:to>
+                                    </p:set>
+                                  </p:childTnLst>
+                                </p:cTn>
+                              </p:par>
+                            </p:childTnLst>
+                          </p:cTn>
+                        </p:par>
+                      </p:childTnLst>
+                    </p:cTn>
+                  </p:par>
+                </p:childTnLst>
+              </p:cTn>
+              <p:prevCondLst>
+                <p:cond evt="onPrev" delay="0">
+                  <p:tgtEl>
+                    <p:sldTgt/>
+                  </p:tgtEl>
+                </p:cond>
+              </p:prevCondLst>
+              <p:nextCondLst>
+                <p:cond evt="onNext" delay="0">
+                  <p:tgtEl>
+                    <p:sldTgt/>
+                  </p:tgtEl>
+                </p:cond>
+              </p:nextCondLst>
+            </p:seq>
+          </p:childTnLst>
+        </p:cTn>
+      </p:par>
+    </p:tnLst>
+    <p:bldLst>
+      <p:bldP spid="3" grpId="0" uiExpand="1" build="p"/>
+    </p:bldLst>
+  </p:timing>
+</p:sld>
+</file>
+
+<file path=ppt/slides/slide13.xml><?xml version="1.0" encoding="utf-8"?>
+<p:sld xmlns:a="http://schemas.openxmlformats.org/drawingml/2006/main" xmlns:r="http://schemas.openxmlformats.org/officeDocument/2006/relationships" xmlns:p="http://schemas.openxmlformats.org/presentationml/2006/main">
+  <p:cSld>
+    <p:spTree>
+      <p:nvGrpSpPr>
+        <p:cNvPr id="1" name=""/>
+        <p:cNvGrpSpPr/>
+        <p:nvPr/>
+      </p:nvGrpSpPr>
+      <p:grpSpPr>
+        <a:xfrm>
+          <a:off x="0" y="0"/>
+          <a:ext cx="0" cy="0"/>
+          <a:chOff x="0" y="0"/>
+          <a:chExt cx="0" cy="0"/>
+        </a:xfrm>
+      </p:grpSpPr>
       <p:pic>
         <p:nvPicPr>
           <p:cNvPr id="5" name="Content Placeholder 4" descr="Text&#10;&#10;Description automatically generated">
@@ -4204,7 +4587,7 @@
 </p:sld>
 </file>
 
-<file path=ppt/slides/slide13.xml><?xml version="1.0" encoding="utf-8"?>
+<file path=ppt/slides/slide14.xml><?xml version="1.0" encoding="utf-8"?>
 <p:sld xmlns:a="http://schemas.openxmlformats.org/drawingml/2006/main" xmlns:r="http://schemas.openxmlformats.org/officeDocument/2006/relationships" xmlns:p="http://schemas.openxmlformats.org/presentationml/2006/main">
   <p:cSld>
     <p:spTree>
@@ -4531,389 +4914,6 @@
         </p:cTn>
       </p:par>
     </p:tnLst>
-  </p:timing>
-</p:sld>
-</file>
-
-<file path=ppt/slides/slide14.xml><?xml version="1.0" encoding="utf-8"?>
-<p:sld xmlns:a="http://schemas.openxmlformats.org/drawingml/2006/main" xmlns:r="http://schemas.openxmlformats.org/officeDocument/2006/relationships" xmlns:p="http://schemas.openxmlformats.org/presentationml/2006/main">
-  <p:cSld>
-    <p:spTree>
-      <p:nvGrpSpPr>
-        <p:cNvPr id="1" name=""/>
-        <p:cNvGrpSpPr/>
-        <p:nvPr/>
-      </p:nvGrpSpPr>
-      <p:grpSpPr>
-        <a:xfrm>
-          <a:off x="0" y="0"/>
-          <a:ext cx="0" cy="0"/>
-          <a:chOff x="0" y="0"/>
-          <a:chExt cx="0" cy="0"/>
-        </a:xfrm>
-      </p:grpSpPr>
-      <p:sp>
-        <p:nvSpPr>
-          <p:cNvPr id="2" name="Title 1">
-            <a:extLst>
-              <a:ext uri="{FF2B5EF4-FFF2-40B4-BE49-F238E27FC236}">
-                <a16:creationId xmlns:a16="http://schemas.microsoft.com/office/drawing/2014/main" id="{E03281FC-7210-4ED9-9307-58A3CE63E058}"/>
-              </a:ext>
-            </a:extLst>
-          </p:cNvPr>
-          <p:cNvSpPr>
-            <a:spLocks noGrp="1"/>
-          </p:cNvSpPr>
-          <p:nvPr>
-            <p:ph type="title"/>
-          </p:nvPr>
-        </p:nvSpPr>
-        <p:spPr/>
-        <p:txBody>
-          <a:bodyPr/>
-          <a:lstStyle/>
-          <a:p>
-            <a:r>
-              <a:rPr lang="en-US" dirty="0"/>
-              <a:t>Message Format: </a:t>
-            </a:r>
-            <a:r>
-              <a:rPr lang="en-US" dirty="0" err="1"/>
-              <a:t>ToString</a:t>
-            </a:r>
-            <a:r>
-              <a:rPr lang="en-US" dirty="0"/>
-              <a:t>() vs Dump</a:t>
-            </a:r>
-          </a:p>
-        </p:txBody>
-      </p:sp>
-      <p:sp>
-        <p:nvSpPr>
-          <p:cNvPr id="3" name="Content Placeholder 2">
-            <a:extLst>
-              <a:ext uri="{FF2B5EF4-FFF2-40B4-BE49-F238E27FC236}">
-                <a16:creationId xmlns:a16="http://schemas.microsoft.com/office/drawing/2014/main" id="{820D962F-E825-4961-890B-5E3849C17450}"/>
-              </a:ext>
-            </a:extLst>
-          </p:cNvPr>
-          <p:cNvSpPr>
-            <a:spLocks noGrp="1"/>
-          </p:cNvSpPr>
-          <p:nvPr>
-            <p:ph idx="1"/>
-          </p:nvPr>
-        </p:nvSpPr>
-        <p:spPr/>
-        <p:txBody>
-          <a:bodyPr/>
-          <a:lstStyle/>
-          <a:p>
-            <a:r>
-              <a:rPr lang="fr-FR" dirty="0"/>
-              <a:t>_</a:t>
-            </a:r>
-            <a:r>
-              <a:rPr lang="fr-FR" dirty="0" err="1"/>
-              <a:t>logger.LogInformation</a:t>
-            </a:r>
-            <a:r>
-              <a:rPr lang="fr-FR" dirty="0"/>
-              <a:t>("User Information {User}", </a:t>
-            </a:r>
-            <a:r>
-              <a:rPr lang="fr-FR" dirty="0" err="1"/>
-              <a:t>Request</a:t>
-            </a:r>
-            <a:r>
-              <a:rPr lang="fr-FR" dirty="0"/>
-              <a:t>);</a:t>
-            </a:r>
-          </a:p>
-          <a:p>
-            <a:pPr lvl="1"/>
-            <a:r>
-              <a:rPr lang="fr-FR" dirty="0"/>
-              <a:t>[10:49:27 acd7bc9a-669d-4af5-9d4d-530b65966ef4 INF] User Information </a:t>
-            </a:r>
-            <a:r>
-              <a:rPr lang="fr-FR" dirty="0" err="1"/>
-              <a:t>Microsoft.AspNetCore.Http.DefaultHttpRequest</a:t>
-            </a:r>
-            <a:endParaRPr lang="fr-FR" dirty="0"/>
-          </a:p>
-          <a:p>
-            <a:r>
-              <a:rPr lang="en-US" dirty="0"/>
-              <a:t>_</a:t>
-            </a:r>
-            <a:r>
-              <a:rPr lang="en-US" dirty="0" err="1"/>
-              <a:t>logger.LogInformation</a:t>
-            </a:r>
-            <a:r>
-              <a:rPr lang="en-US" dirty="0"/>
-              <a:t>("Full User Identity Details {@User}", </a:t>
-            </a:r>
-            <a:r>
-              <a:rPr lang="en-US" dirty="0" err="1"/>
-              <a:t>User.Identity</a:t>
-            </a:r>
-            <a:r>
-              <a:rPr lang="en-US" dirty="0"/>
-              <a:t>);</a:t>
-            </a:r>
-          </a:p>
-          <a:p>
-            <a:pPr lvl="1"/>
-            <a:r>
-              <a:rPr lang="en-US" dirty="0"/>
-              <a:t>[10:49:27 acd7bc9a-669d-4af5-9d4d-530b65966ef4 INF] Full User Identity Details {"AuthenticationType":null,"IsAuthenticated":false,"Actor":null,"BootstrapContext":null,"Claims":[],"Label“….</a:t>
-            </a:r>
-          </a:p>
-        </p:txBody>
-      </p:sp>
-    </p:spTree>
-    <p:extLst>
-      <p:ext uri="{BB962C8B-B14F-4D97-AF65-F5344CB8AC3E}">
-        <p14:creationId xmlns:p14="http://schemas.microsoft.com/office/powerpoint/2010/main" val="2125271925"/>
-      </p:ext>
-    </p:extLst>
-  </p:cSld>
-  <p:clrMapOvr>
-    <a:masterClrMapping/>
-  </p:clrMapOvr>
-  <p:timing>
-    <p:tnLst>
-      <p:par>
-        <p:cTn id="1" dur="indefinite" restart="never" nodeType="tmRoot">
-          <p:childTnLst>
-            <p:seq concurrent="1" nextAc="seek">
-              <p:cTn id="2" dur="indefinite" nodeType="mainSeq">
-                <p:childTnLst>
-                  <p:par>
-                    <p:cTn id="3" fill="hold">
-                      <p:stCondLst>
-                        <p:cond delay="indefinite"/>
-                        <p:cond evt="onBegin" delay="0">
-                          <p:tn val="2"/>
-                        </p:cond>
-                      </p:stCondLst>
-                      <p:childTnLst>
-                        <p:par>
-                          <p:cTn id="4" fill="hold">
-                            <p:stCondLst>
-                              <p:cond delay="0"/>
-                            </p:stCondLst>
-                            <p:childTnLst>
-                              <p:par>
-                                <p:cTn id="5" presetID="1" presetClass="entr" presetSubtype="0" fill="hold" grpId="0" nodeType="withEffect">
-                                  <p:stCondLst>
-                                    <p:cond delay="0"/>
-                                  </p:stCondLst>
-                                  <p:childTnLst>
-                                    <p:set>
-                                      <p:cBhvr>
-                                        <p:cTn id="6" dur="1" fill="hold">
-                                          <p:stCondLst>
-                                            <p:cond delay="0"/>
-                                          </p:stCondLst>
-                                        </p:cTn>
-                                        <p:tgtEl>
-                                          <p:spTgt spid="3">
-                                            <p:txEl>
-                                              <p:pRg st="0" end="0"/>
-                                            </p:txEl>
-                                          </p:spTgt>
-                                        </p:tgtEl>
-                                        <p:attrNameLst>
-                                          <p:attrName>style.visibility</p:attrName>
-                                        </p:attrNameLst>
-                                      </p:cBhvr>
-                                      <p:to>
-                                        <p:strVal val="visible"/>
-                                      </p:to>
-                                    </p:set>
-                                  </p:childTnLst>
-                                </p:cTn>
-                              </p:par>
-                            </p:childTnLst>
-                          </p:cTn>
-                        </p:par>
-                      </p:childTnLst>
-                    </p:cTn>
-                  </p:par>
-                  <p:par>
-                    <p:cTn id="7" fill="hold">
-                      <p:stCondLst>
-                        <p:cond delay="indefinite"/>
-                      </p:stCondLst>
-                      <p:childTnLst>
-                        <p:par>
-                          <p:cTn id="8" fill="hold">
-                            <p:stCondLst>
-                              <p:cond delay="0"/>
-                            </p:stCondLst>
-                            <p:childTnLst>
-                              <p:par>
-                                <p:cTn id="9" presetID="1" presetClass="entr" presetSubtype="0" fill="hold" grpId="0" nodeType="clickEffect">
-                                  <p:stCondLst>
-                                    <p:cond delay="0"/>
-                                  </p:stCondLst>
-                                  <p:childTnLst>
-                                    <p:set>
-                                      <p:cBhvr>
-                                        <p:cTn id="10" dur="1" fill="hold">
-                                          <p:stCondLst>
-                                            <p:cond delay="0"/>
-                                          </p:stCondLst>
-                                        </p:cTn>
-                                        <p:tgtEl>
-                                          <p:spTgt spid="3">
-                                            <p:txEl>
-                                              <p:pRg st="1" end="1"/>
-                                            </p:txEl>
-                                          </p:spTgt>
-                                        </p:tgtEl>
-                                        <p:attrNameLst>
-                                          <p:attrName>style.visibility</p:attrName>
-                                        </p:attrNameLst>
-                                      </p:cBhvr>
-                                      <p:to>
-                                        <p:strVal val="visible"/>
-                                      </p:to>
-                                    </p:set>
-                                  </p:childTnLst>
-                                </p:cTn>
-                              </p:par>
-                            </p:childTnLst>
-                          </p:cTn>
-                        </p:par>
-                      </p:childTnLst>
-                    </p:cTn>
-                  </p:par>
-                  <p:par>
-                    <p:cTn id="11" fill="hold">
-                      <p:stCondLst>
-                        <p:cond delay="indefinite"/>
-                      </p:stCondLst>
-                      <p:childTnLst>
-                        <p:par>
-                          <p:cTn id="12" fill="hold">
-                            <p:stCondLst>
-                              <p:cond delay="0"/>
-                            </p:stCondLst>
-                            <p:childTnLst>
-                              <p:par>
-                                <p:cTn id="13" presetID="1" presetClass="entr" presetSubtype="0" fill="hold" grpId="0" nodeType="clickEffect">
-                                  <p:stCondLst>
-                                    <p:cond delay="0"/>
-                                  </p:stCondLst>
-                                  <p:childTnLst>
-                                    <p:set>
-                                      <p:cBhvr>
-                                        <p:cTn id="14" dur="1" fill="hold">
-                                          <p:stCondLst>
-                                            <p:cond delay="0"/>
-                                          </p:stCondLst>
-                                        </p:cTn>
-                                        <p:tgtEl>
-                                          <p:spTgt spid="3">
-                                            <p:txEl>
-                                              <p:pRg st="2" end="2"/>
-                                            </p:txEl>
-                                          </p:spTgt>
-                                        </p:tgtEl>
-                                        <p:attrNameLst>
-                                          <p:attrName>style.visibility</p:attrName>
-                                        </p:attrNameLst>
-                                      </p:cBhvr>
-                                      <p:to>
-                                        <p:strVal val="visible"/>
-                                      </p:to>
-                                    </p:set>
-                                  </p:childTnLst>
-                                </p:cTn>
-                              </p:par>
-                            </p:childTnLst>
-                          </p:cTn>
-                        </p:par>
-                      </p:childTnLst>
-                    </p:cTn>
-                  </p:par>
-                  <p:par>
-                    <p:cTn id="15" fill="hold">
-                      <p:stCondLst>
-                        <p:cond delay="indefinite"/>
-                      </p:stCondLst>
-                      <p:childTnLst>
-                        <p:par>
-                          <p:cTn id="16" fill="hold">
-                            <p:stCondLst>
-                              <p:cond delay="0"/>
-                            </p:stCondLst>
-                            <p:childTnLst>
-                              <p:par>
-                                <p:cTn id="17" presetID="1" presetClass="entr" presetSubtype="0" fill="hold" grpId="0" nodeType="clickEffect">
-                                  <p:stCondLst>
-                                    <p:cond delay="0"/>
-                                  </p:stCondLst>
-                                  <p:childTnLst>
-                                    <p:set>
-                                      <p:cBhvr>
-                                        <p:cTn id="18" dur="1" fill="hold">
-                                          <p:stCondLst>
-                                            <p:cond delay="0"/>
-                                          </p:stCondLst>
-                                        </p:cTn>
-                                        <p:tgtEl>
-                                          <p:spTgt spid="3">
-                                            <p:txEl>
-                                              <p:pRg st="3" end="3"/>
-                                            </p:txEl>
-                                          </p:spTgt>
-                                        </p:tgtEl>
-                                        <p:attrNameLst>
-                                          <p:attrName>style.visibility</p:attrName>
-                                        </p:attrNameLst>
-                                      </p:cBhvr>
-                                      <p:to>
-                                        <p:strVal val="visible"/>
-                                      </p:to>
-                                    </p:set>
-                                  </p:childTnLst>
-                                </p:cTn>
-                              </p:par>
-                            </p:childTnLst>
-                          </p:cTn>
-                        </p:par>
-                      </p:childTnLst>
-                    </p:cTn>
-                  </p:par>
-                </p:childTnLst>
-              </p:cTn>
-              <p:prevCondLst>
-                <p:cond evt="onPrev" delay="0">
-                  <p:tgtEl>
-                    <p:sldTgt/>
-                  </p:tgtEl>
-                </p:cond>
-              </p:prevCondLst>
-              <p:nextCondLst>
-                <p:cond evt="onNext" delay="0">
-                  <p:tgtEl>
-                    <p:sldTgt/>
-                  </p:tgtEl>
-                </p:cond>
-              </p:nextCondLst>
-            </p:seq>
-          </p:childTnLst>
-        </p:cTn>
-      </p:par>
-    </p:tnLst>
-    <p:bldLst>
-      <p:bldP spid="3" grpId="0" uiExpand="1" build="p"/>
-    </p:bldLst>
   </p:timing>
 </p:sld>
 </file>

</xml_diff>

<commit_message>
Fixed missing elements in presentation
</commit_message>
<xml_diff>
--- a/Presentation/But It Was Logged.pptx
+++ b/Presentation/But It Was Logged.pptx
@@ -15,10 +15,10 @@
     <p:sldId id="263" r:id="rId9"/>
     <p:sldId id="267" r:id="rId10"/>
     <p:sldId id="268" r:id="rId11"/>
-    <p:sldId id="265" r:id="rId12"/>
-    <p:sldId id="271" r:id="rId13"/>
-    <p:sldId id="269" r:id="rId14"/>
-    <p:sldId id="270" r:id="rId15"/>
+    <p:sldId id="269" r:id="rId12"/>
+    <p:sldId id="270" r:id="rId13"/>
+    <p:sldId id="265" r:id="rId14"/>
+    <p:sldId id="271" r:id="rId15"/>
     <p:sldId id="261" r:id="rId16"/>
     <p:sldId id="266" r:id="rId17"/>
   </p:sldIdLst>
@@ -3020,7 +3020,7 @@
           <a:p>
             <a:r>
               <a:rPr lang="en-US" dirty="0"/>
-              <a:t>A practical look at logging with .NET 6 &amp; Beyond</a:t>
+              <a:t>A practical look at logging with .NET Core</a:t>
             </a:r>
           </a:p>
         </p:txBody>
@@ -3078,7 +3078,7 @@
           <a:p>
             <a:r>
               <a:rPr lang="en-US" dirty="0"/>
-              <a:t>Unique Aspects of Logging in .NET 6</a:t>
+              <a:t>Unique Aspects of Logging in .NET</a:t>
             </a:r>
           </a:p>
         </p:txBody>
@@ -3164,12 +3164,8 @@
             <a:pPr lvl="2"/>
             <a:r>
               <a:rPr lang="en-US" dirty="0"/>
-              <a:t>Its creator also offers a product “Seq” which I’ll discuss shortly</a:t>
-            </a:r>
-          </a:p>
-          <a:p>
-            <a:pPr lvl="1"/>
-            <a:endParaRPr lang="en-US" dirty="0"/>
+              <a:t>Its creator also offers a product “Seq”</a:t>
+            </a:r>
           </a:p>
         </p:txBody>
       </p:sp>
@@ -4042,493 +4038,6 @@
 </file>
 
 <file path=ppt/slides/slide11.xml><?xml version="1.0" encoding="utf-8"?>
-<p:sld xmlns:a="http://schemas.openxmlformats.org/drawingml/2006/main" xmlns:r="http://schemas.openxmlformats.org/officeDocument/2006/relationships" xmlns:p="http://schemas.openxmlformats.org/presentationml/2006/main">
-  <p:cSld>
-    <p:spTree>
-      <p:nvGrpSpPr>
-        <p:cNvPr id="1" name=""/>
-        <p:cNvGrpSpPr/>
-        <p:nvPr/>
-      </p:nvGrpSpPr>
-      <p:grpSpPr>
-        <a:xfrm>
-          <a:off x="0" y="0"/>
-          <a:ext cx="0" cy="0"/>
-          <a:chOff x="0" y="0"/>
-          <a:chExt cx="0" cy="0"/>
-        </a:xfrm>
-      </p:grpSpPr>
-      <p:sp>
-        <p:nvSpPr>
-          <p:cNvPr id="2" name="Title 1">
-            <a:extLst>
-              <a:ext uri="{FF2B5EF4-FFF2-40B4-BE49-F238E27FC236}">
-                <a16:creationId xmlns:a16="http://schemas.microsoft.com/office/drawing/2014/main" id="{4DFA0014-64DE-466A-A110-CFA3A9CABAEB}"/>
-              </a:ext>
-            </a:extLst>
-          </p:cNvPr>
-          <p:cNvSpPr>
-            <a:spLocks noGrp="1"/>
-          </p:cNvSpPr>
-          <p:nvPr>
-            <p:ph type="title"/>
-          </p:nvPr>
-        </p:nvSpPr>
-        <p:spPr/>
-        <p:txBody>
-          <a:bodyPr/>
-          <a:lstStyle/>
-          <a:p>
-            <a:r>
-              <a:rPr lang="en-US" dirty="0"/>
-              <a:t>Combined Log Stream Benefits</a:t>
-            </a:r>
-          </a:p>
-        </p:txBody>
-      </p:sp>
-      <p:sp>
-        <p:nvSpPr>
-          <p:cNvPr id="3" name="Content Placeholder 2">
-            <a:extLst>
-              <a:ext uri="{FF2B5EF4-FFF2-40B4-BE49-F238E27FC236}">
-                <a16:creationId xmlns:a16="http://schemas.microsoft.com/office/drawing/2014/main" id="{7A827662-8810-466A-8BD3-9ACFB8D0C9F6}"/>
-              </a:ext>
-            </a:extLst>
-          </p:cNvPr>
-          <p:cNvSpPr>
-            <a:spLocks noGrp="1"/>
-          </p:cNvSpPr>
-          <p:nvPr>
-            <p:ph idx="1"/>
-          </p:nvPr>
-        </p:nvSpPr>
-        <p:spPr/>
-        <p:txBody>
-          <a:bodyPr/>
-          <a:lstStyle/>
-          <a:p>
-            <a:r>
-              <a:rPr lang="en-US" dirty="0"/>
-              <a:t>Logging can often expose bottlenecks, or optimizations that are missed</a:t>
-            </a:r>
-          </a:p>
-          <a:p>
-            <a:r>
-              <a:rPr lang="en-US" dirty="0"/>
-              <a:t>EF Core for example logs out “optimizations” on model start</a:t>
-            </a:r>
-          </a:p>
-          <a:p>
-            <a:r>
-              <a:rPr lang="en-US" dirty="0"/>
-              <a:t>Can log things for diagnostic purposes, such as Query &amp; Performance for EF Core.</a:t>
-            </a:r>
-          </a:p>
-          <a:p>
-            <a:r>
-              <a:rPr lang="en-US" dirty="0"/>
-              <a:t>Full breadcrumb traffic patterns</a:t>
-            </a:r>
-          </a:p>
-        </p:txBody>
-      </p:sp>
-    </p:spTree>
-    <p:extLst>
-      <p:ext uri="{BB962C8B-B14F-4D97-AF65-F5344CB8AC3E}">
-        <p14:creationId xmlns:p14="http://schemas.microsoft.com/office/powerpoint/2010/main" val="1487358471"/>
-      </p:ext>
-    </p:extLst>
-  </p:cSld>
-  <p:clrMapOvr>
-    <a:masterClrMapping/>
-  </p:clrMapOvr>
-</p:sld>
-</file>
-
-<file path=ppt/slides/slide12.xml><?xml version="1.0" encoding="utf-8"?>
-<p:sld xmlns:a="http://schemas.openxmlformats.org/drawingml/2006/main" xmlns:r="http://schemas.openxmlformats.org/officeDocument/2006/relationships" xmlns:p="http://schemas.openxmlformats.org/presentationml/2006/main">
-  <p:cSld>
-    <p:spTree>
-      <p:nvGrpSpPr>
-        <p:cNvPr id="1" name=""/>
-        <p:cNvGrpSpPr/>
-        <p:nvPr/>
-      </p:nvGrpSpPr>
-      <p:grpSpPr>
-        <a:xfrm>
-          <a:off x="0" y="0"/>
-          <a:ext cx="0" cy="0"/>
-          <a:chOff x="0" y="0"/>
-          <a:chExt cx="0" cy="0"/>
-        </a:xfrm>
-      </p:grpSpPr>
-      <p:sp>
-        <p:nvSpPr>
-          <p:cNvPr id="2" name="Title 1">
-            <a:extLst>
-              <a:ext uri="{FF2B5EF4-FFF2-40B4-BE49-F238E27FC236}">
-                <a16:creationId xmlns:a16="http://schemas.microsoft.com/office/drawing/2014/main" id="{E03281FC-7210-4ED9-9307-58A3CE63E058}"/>
-              </a:ext>
-            </a:extLst>
-          </p:cNvPr>
-          <p:cNvSpPr>
-            <a:spLocks noGrp="1"/>
-          </p:cNvSpPr>
-          <p:nvPr>
-            <p:ph type="title"/>
-          </p:nvPr>
-        </p:nvSpPr>
-        <p:spPr/>
-        <p:txBody>
-          <a:bodyPr/>
-          <a:lstStyle/>
-          <a:p>
-            <a:r>
-              <a:rPr lang="en-US" dirty="0"/>
-              <a:t>Message Format: </a:t>
-            </a:r>
-            <a:r>
-              <a:rPr lang="en-US" dirty="0" err="1"/>
-              <a:t>ToString</a:t>
-            </a:r>
-            <a:r>
-              <a:rPr lang="en-US" dirty="0"/>
-              <a:t>() vs Dump</a:t>
-            </a:r>
-          </a:p>
-        </p:txBody>
-      </p:sp>
-      <p:sp>
-        <p:nvSpPr>
-          <p:cNvPr id="3" name="Content Placeholder 2">
-            <a:extLst>
-              <a:ext uri="{FF2B5EF4-FFF2-40B4-BE49-F238E27FC236}">
-                <a16:creationId xmlns:a16="http://schemas.microsoft.com/office/drawing/2014/main" id="{820D962F-E825-4961-890B-5E3849C17450}"/>
-              </a:ext>
-            </a:extLst>
-          </p:cNvPr>
-          <p:cNvSpPr>
-            <a:spLocks noGrp="1"/>
-          </p:cNvSpPr>
-          <p:nvPr>
-            <p:ph idx="1"/>
-          </p:nvPr>
-        </p:nvSpPr>
-        <p:spPr/>
-        <p:txBody>
-          <a:bodyPr/>
-          <a:lstStyle/>
-          <a:p>
-            <a:r>
-              <a:rPr lang="fr-FR" dirty="0"/>
-              <a:t>_</a:t>
-            </a:r>
-            <a:r>
-              <a:rPr lang="fr-FR" dirty="0" err="1"/>
-              <a:t>logger.LogInformation</a:t>
-            </a:r>
-            <a:r>
-              <a:rPr lang="fr-FR" dirty="0"/>
-              <a:t>("User Information {User}", </a:t>
-            </a:r>
-            <a:r>
-              <a:rPr lang="fr-FR" dirty="0" err="1"/>
-              <a:t>Request</a:t>
-            </a:r>
-            <a:r>
-              <a:rPr lang="fr-FR" dirty="0"/>
-              <a:t>);</a:t>
-            </a:r>
-          </a:p>
-          <a:p>
-            <a:pPr lvl="1"/>
-            <a:r>
-              <a:rPr lang="fr-FR" dirty="0"/>
-              <a:t>[10:49:27 acd7bc9a-669d-4af5-9d4d-530b65966ef4 INF] User Information </a:t>
-            </a:r>
-            <a:r>
-              <a:rPr lang="fr-FR" dirty="0" err="1"/>
-              <a:t>Microsoft.AspNetCore.Http.DefaultHttpRequest</a:t>
-            </a:r>
-            <a:endParaRPr lang="fr-FR" dirty="0"/>
-          </a:p>
-          <a:p>
-            <a:r>
-              <a:rPr lang="en-US" dirty="0"/>
-              <a:t>_</a:t>
-            </a:r>
-            <a:r>
-              <a:rPr lang="en-US" dirty="0" err="1"/>
-              <a:t>logger.LogInformation</a:t>
-            </a:r>
-            <a:r>
-              <a:rPr lang="en-US" dirty="0"/>
-              <a:t>("Full User Identity Details {@User}", </a:t>
-            </a:r>
-            <a:r>
-              <a:rPr lang="en-US" dirty="0" err="1"/>
-              <a:t>User.Identity</a:t>
-            </a:r>
-            <a:r>
-              <a:rPr lang="en-US" dirty="0"/>
-              <a:t>);</a:t>
-            </a:r>
-          </a:p>
-          <a:p>
-            <a:pPr lvl="1"/>
-            <a:r>
-              <a:rPr lang="en-US" dirty="0"/>
-              <a:t>[10:49:27 acd7bc9a-669d-4af5-9d4d-530b65966ef4 INF] Full User Identity Details {"AuthenticationType":null,"IsAuthenticated":false,"Actor":null,"BootstrapContext":null,"Claims":[],"Label“….</a:t>
-            </a:r>
-          </a:p>
-        </p:txBody>
-      </p:sp>
-    </p:spTree>
-    <p:extLst>
-      <p:ext uri="{BB962C8B-B14F-4D97-AF65-F5344CB8AC3E}">
-        <p14:creationId xmlns:p14="http://schemas.microsoft.com/office/powerpoint/2010/main" val="2125271925"/>
-      </p:ext>
-    </p:extLst>
-  </p:cSld>
-  <p:clrMapOvr>
-    <a:masterClrMapping/>
-  </p:clrMapOvr>
-  <p:timing>
-    <p:tnLst>
-      <p:par>
-        <p:cTn id="1" dur="indefinite" restart="never" nodeType="tmRoot">
-          <p:childTnLst>
-            <p:seq concurrent="1" nextAc="seek">
-              <p:cTn id="2" dur="indefinite" nodeType="mainSeq">
-                <p:childTnLst>
-                  <p:par>
-                    <p:cTn id="3" fill="hold">
-                      <p:stCondLst>
-                        <p:cond delay="indefinite"/>
-                        <p:cond evt="onBegin" delay="0">
-                          <p:tn val="2"/>
-                        </p:cond>
-                      </p:stCondLst>
-                      <p:childTnLst>
-                        <p:par>
-                          <p:cTn id="4" fill="hold">
-                            <p:stCondLst>
-                              <p:cond delay="0"/>
-                            </p:stCondLst>
-                            <p:childTnLst>
-                              <p:par>
-                                <p:cTn id="5" presetID="1" presetClass="entr" presetSubtype="0" fill="hold" grpId="0" nodeType="withEffect">
-                                  <p:stCondLst>
-                                    <p:cond delay="0"/>
-                                  </p:stCondLst>
-                                  <p:childTnLst>
-                                    <p:set>
-                                      <p:cBhvr>
-                                        <p:cTn id="6" dur="1" fill="hold">
-                                          <p:stCondLst>
-                                            <p:cond delay="0"/>
-                                          </p:stCondLst>
-                                        </p:cTn>
-                                        <p:tgtEl>
-                                          <p:spTgt spid="3">
-                                            <p:txEl>
-                                              <p:pRg st="0" end="0"/>
-                                            </p:txEl>
-                                          </p:spTgt>
-                                        </p:tgtEl>
-                                        <p:attrNameLst>
-                                          <p:attrName>style.visibility</p:attrName>
-                                        </p:attrNameLst>
-                                      </p:cBhvr>
-                                      <p:to>
-                                        <p:strVal val="visible"/>
-                                      </p:to>
-                                    </p:set>
-                                  </p:childTnLst>
-                                </p:cTn>
-                              </p:par>
-                            </p:childTnLst>
-                          </p:cTn>
-                        </p:par>
-                      </p:childTnLst>
-                    </p:cTn>
-                  </p:par>
-                  <p:par>
-                    <p:cTn id="7" fill="hold">
-                      <p:stCondLst>
-                        <p:cond delay="indefinite"/>
-                      </p:stCondLst>
-                      <p:childTnLst>
-                        <p:par>
-                          <p:cTn id="8" fill="hold">
-                            <p:stCondLst>
-                              <p:cond delay="0"/>
-                            </p:stCondLst>
-                            <p:childTnLst>
-                              <p:par>
-                                <p:cTn id="9" presetID="1" presetClass="entr" presetSubtype="0" fill="hold" grpId="0" nodeType="clickEffect">
-                                  <p:stCondLst>
-                                    <p:cond delay="0"/>
-                                  </p:stCondLst>
-                                  <p:childTnLst>
-                                    <p:set>
-                                      <p:cBhvr>
-                                        <p:cTn id="10" dur="1" fill="hold">
-                                          <p:stCondLst>
-                                            <p:cond delay="0"/>
-                                          </p:stCondLst>
-                                        </p:cTn>
-                                        <p:tgtEl>
-                                          <p:spTgt spid="3">
-                                            <p:txEl>
-                                              <p:pRg st="1" end="1"/>
-                                            </p:txEl>
-                                          </p:spTgt>
-                                        </p:tgtEl>
-                                        <p:attrNameLst>
-                                          <p:attrName>style.visibility</p:attrName>
-                                        </p:attrNameLst>
-                                      </p:cBhvr>
-                                      <p:to>
-                                        <p:strVal val="visible"/>
-                                      </p:to>
-                                    </p:set>
-                                  </p:childTnLst>
-                                </p:cTn>
-                              </p:par>
-                            </p:childTnLst>
-                          </p:cTn>
-                        </p:par>
-                      </p:childTnLst>
-                    </p:cTn>
-                  </p:par>
-                  <p:par>
-                    <p:cTn id="11" fill="hold">
-                      <p:stCondLst>
-                        <p:cond delay="indefinite"/>
-                      </p:stCondLst>
-                      <p:childTnLst>
-                        <p:par>
-                          <p:cTn id="12" fill="hold">
-                            <p:stCondLst>
-                              <p:cond delay="0"/>
-                            </p:stCondLst>
-                            <p:childTnLst>
-                              <p:par>
-                                <p:cTn id="13" presetID="1" presetClass="entr" presetSubtype="0" fill="hold" grpId="0" nodeType="clickEffect">
-                                  <p:stCondLst>
-                                    <p:cond delay="0"/>
-                                  </p:stCondLst>
-                                  <p:childTnLst>
-                                    <p:set>
-                                      <p:cBhvr>
-                                        <p:cTn id="14" dur="1" fill="hold">
-                                          <p:stCondLst>
-                                            <p:cond delay="0"/>
-                                          </p:stCondLst>
-                                        </p:cTn>
-                                        <p:tgtEl>
-                                          <p:spTgt spid="3">
-                                            <p:txEl>
-                                              <p:pRg st="2" end="2"/>
-                                            </p:txEl>
-                                          </p:spTgt>
-                                        </p:tgtEl>
-                                        <p:attrNameLst>
-                                          <p:attrName>style.visibility</p:attrName>
-                                        </p:attrNameLst>
-                                      </p:cBhvr>
-                                      <p:to>
-                                        <p:strVal val="visible"/>
-                                      </p:to>
-                                    </p:set>
-                                  </p:childTnLst>
-                                </p:cTn>
-                              </p:par>
-                            </p:childTnLst>
-                          </p:cTn>
-                        </p:par>
-                      </p:childTnLst>
-                    </p:cTn>
-                  </p:par>
-                  <p:par>
-                    <p:cTn id="15" fill="hold">
-                      <p:stCondLst>
-                        <p:cond delay="indefinite"/>
-                      </p:stCondLst>
-                      <p:childTnLst>
-                        <p:par>
-                          <p:cTn id="16" fill="hold">
-                            <p:stCondLst>
-                              <p:cond delay="0"/>
-                            </p:stCondLst>
-                            <p:childTnLst>
-                              <p:par>
-                                <p:cTn id="17" presetID="1" presetClass="entr" presetSubtype="0" fill="hold" grpId="0" nodeType="clickEffect">
-                                  <p:stCondLst>
-                                    <p:cond delay="0"/>
-                                  </p:stCondLst>
-                                  <p:childTnLst>
-                                    <p:set>
-                                      <p:cBhvr>
-                                        <p:cTn id="18" dur="1" fill="hold">
-                                          <p:stCondLst>
-                                            <p:cond delay="0"/>
-                                          </p:stCondLst>
-                                        </p:cTn>
-                                        <p:tgtEl>
-                                          <p:spTgt spid="3">
-                                            <p:txEl>
-                                              <p:pRg st="3" end="3"/>
-                                            </p:txEl>
-                                          </p:spTgt>
-                                        </p:tgtEl>
-                                        <p:attrNameLst>
-                                          <p:attrName>style.visibility</p:attrName>
-                                        </p:attrNameLst>
-                                      </p:cBhvr>
-                                      <p:to>
-                                        <p:strVal val="visible"/>
-                                      </p:to>
-                                    </p:set>
-                                  </p:childTnLst>
-                                </p:cTn>
-                              </p:par>
-                            </p:childTnLst>
-                          </p:cTn>
-                        </p:par>
-                      </p:childTnLst>
-                    </p:cTn>
-                  </p:par>
-                </p:childTnLst>
-              </p:cTn>
-              <p:prevCondLst>
-                <p:cond evt="onPrev" delay="0">
-                  <p:tgtEl>
-                    <p:sldTgt/>
-                  </p:tgtEl>
-                </p:cond>
-              </p:prevCondLst>
-              <p:nextCondLst>
-                <p:cond evt="onNext" delay="0">
-                  <p:tgtEl>
-                    <p:sldTgt/>
-                  </p:tgtEl>
-                </p:cond>
-              </p:nextCondLst>
-            </p:seq>
-          </p:childTnLst>
-        </p:cTn>
-      </p:par>
-    </p:tnLst>
-    <p:bldLst>
-      <p:bldP spid="3" grpId="0" uiExpand="1" build="p"/>
-    </p:bldLst>
-  </p:timing>
-</p:sld>
-</file>
-
-<file path=ppt/slides/slide13.xml><?xml version="1.0" encoding="utf-8"?>
 <p:sld xmlns:a="http://schemas.openxmlformats.org/drawingml/2006/main" xmlns:r="http://schemas.openxmlformats.org/officeDocument/2006/relationships" xmlns:p="http://schemas.openxmlformats.org/presentationml/2006/main">
   <p:cSld>
     <p:spTree>
@@ -4587,7 +4096,7 @@
 </p:sld>
 </file>
 
-<file path=ppt/slides/slide14.xml><?xml version="1.0" encoding="utf-8"?>
+<file path=ppt/slides/slide12.xml><?xml version="1.0" encoding="utf-8"?>
 <p:sld xmlns:a="http://schemas.openxmlformats.org/drawingml/2006/main" xmlns:r="http://schemas.openxmlformats.org/officeDocument/2006/relationships" xmlns:p="http://schemas.openxmlformats.org/presentationml/2006/main">
   <p:cSld>
     <p:spTree>
@@ -4918,6 +4427,1386 @@
 </p:sld>
 </file>
 
+<file path=ppt/slides/slide13.xml><?xml version="1.0" encoding="utf-8"?>
+<p:sld xmlns:a="http://schemas.openxmlformats.org/drawingml/2006/main" xmlns:r="http://schemas.openxmlformats.org/officeDocument/2006/relationships" xmlns:p="http://schemas.openxmlformats.org/presentationml/2006/main">
+  <p:cSld>
+    <p:spTree>
+      <p:nvGrpSpPr>
+        <p:cNvPr id="1" name=""/>
+        <p:cNvGrpSpPr/>
+        <p:nvPr/>
+      </p:nvGrpSpPr>
+      <p:grpSpPr>
+        <a:xfrm>
+          <a:off x="0" y="0"/>
+          <a:ext cx="0" cy="0"/>
+          <a:chOff x="0" y="0"/>
+          <a:chExt cx="0" cy="0"/>
+        </a:xfrm>
+      </p:grpSpPr>
+      <p:sp>
+        <p:nvSpPr>
+          <p:cNvPr id="2" name="Title 1">
+            <a:extLst>
+              <a:ext uri="{FF2B5EF4-FFF2-40B4-BE49-F238E27FC236}">
+                <a16:creationId xmlns:a16="http://schemas.microsoft.com/office/drawing/2014/main" id="{4DFA0014-64DE-466A-A110-CFA3A9CABAEB}"/>
+              </a:ext>
+            </a:extLst>
+          </p:cNvPr>
+          <p:cNvSpPr>
+            <a:spLocks noGrp="1"/>
+          </p:cNvSpPr>
+          <p:nvPr>
+            <p:ph type="title"/>
+          </p:nvPr>
+        </p:nvSpPr>
+        <p:spPr/>
+        <p:txBody>
+          <a:bodyPr/>
+          <a:lstStyle/>
+          <a:p>
+            <a:r>
+              <a:rPr lang="en-US" dirty="0"/>
+              <a:t>Combined Log Stream Benefits</a:t>
+            </a:r>
+          </a:p>
+        </p:txBody>
+      </p:sp>
+      <p:sp>
+        <p:nvSpPr>
+          <p:cNvPr id="3" name="Content Placeholder 2">
+            <a:extLst>
+              <a:ext uri="{FF2B5EF4-FFF2-40B4-BE49-F238E27FC236}">
+                <a16:creationId xmlns:a16="http://schemas.microsoft.com/office/drawing/2014/main" id="{7A827662-8810-466A-8BD3-9ACFB8D0C9F6}"/>
+              </a:ext>
+            </a:extLst>
+          </p:cNvPr>
+          <p:cNvSpPr>
+            <a:spLocks noGrp="1"/>
+          </p:cNvSpPr>
+          <p:nvPr>
+            <p:ph idx="1"/>
+          </p:nvPr>
+        </p:nvSpPr>
+        <p:spPr/>
+        <p:txBody>
+          <a:bodyPr/>
+          <a:lstStyle/>
+          <a:p>
+            <a:r>
+              <a:rPr lang="en-US" dirty="0"/>
+              <a:t>Logging can often expose bottlenecks, or optimizations that are missed</a:t>
+            </a:r>
+          </a:p>
+          <a:p>
+            <a:pPr lvl="1"/>
+            <a:r>
+              <a:rPr lang="en-US" dirty="0"/>
+              <a:t>EF Core for example logs out “optimizations” on model start</a:t>
+            </a:r>
+          </a:p>
+          <a:p>
+            <a:pPr lvl="1"/>
+            <a:r>
+              <a:rPr lang="en-US" dirty="0"/>
+              <a:t>ASP.NET logs individual timestamps for entry/exit and processing</a:t>
+            </a:r>
+          </a:p>
+          <a:p>
+            <a:pPr lvl="1"/>
+            <a:r>
+              <a:rPr lang="en-US" dirty="0" err="1"/>
+              <a:t>Serilog</a:t>
+            </a:r>
+            <a:r>
+              <a:rPr lang="en-US" dirty="0"/>
+              <a:t> can create a streamlined single-message duration</a:t>
+            </a:r>
+          </a:p>
+          <a:p>
+            <a:r>
+              <a:rPr lang="en-US" dirty="0"/>
+              <a:t>Can log things for diagnostic purposes</a:t>
+            </a:r>
+          </a:p>
+          <a:p>
+            <a:pPr lvl="1"/>
+            <a:r>
+              <a:rPr lang="en-US" dirty="0"/>
+              <a:t>EF Core can log all actual executed SQL</a:t>
+            </a:r>
+          </a:p>
+          <a:p>
+            <a:pPr lvl="1"/>
+            <a:r>
+              <a:rPr lang="en-US" dirty="0"/>
+              <a:t>Routing logs how/why a route was matched</a:t>
+            </a:r>
+          </a:p>
+          <a:p>
+            <a:r>
+              <a:rPr lang="en-US" dirty="0"/>
+              <a:t>Full breadcrumb traffic patterns</a:t>
+            </a:r>
+          </a:p>
+        </p:txBody>
+      </p:sp>
+    </p:spTree>
+    <p:extLst>
+      <p:ext uri="{BB962C8B-B14F-4D97-AF65-F5344CB8AC3E}">
+        <p14:creationId xmlns:p14="http://schemas.microsoft.com/office/powerpoint/2010/main" val="1487358471"/>
+      </p:ext>
+    </p:extLst>
+  </p:cSld>
+  <p:clrMapOvr>
+    <a:masterClrMapping/>
+  </p:clrMapOvr>
+  <p:timing>
+    <p:tnLst>
+      <p:par>
+        <p:cTn id="1" dur="indefinite" restart="never" nodeType="tmRoot">
+          <p:childTnLst>
+            <p:seq concurrent="1" nextAc="seek">
+              <p:cTn id="2" dur="indefinite" nodeType="mainSeq">
+                <p:childTnLst>
+                  <p:par>
+                    <p:cTn id="3" fill="hold">
+                      <p:stCondLst>
+                        <p:cond delay="indefinite"/>
+                        <p:cond evt="onBegin" delay="0">
+                          <p:tn val="2"/>
+                        </p:cond>
+                      </p:stCondLst>
+                      <p:childTnLst>
+                        <p:par>
+                          <p:cTn id="4" fill="hold">
+                            <p:stCondLst>
+                              <p:cond delay="0"/>
+                            </p:stCondLst>
+                            <p:childTnLst>
+                              <p:par>
+                                <p:cTn id="5" presetID="2" presetClass="entr" presetSubtype="4" fill="hold" grpId="0" nodeType="withEffect">
+                                  <p:stCondLst>
+                                    <p:cond delay="0"/>
+                                  </p:stCondLst>
+                                  <p:childTnLst>
+                                    <p:set>
+                                      <p:cBhvr>
+                                        <p:cTn id="6" dur="1" fill="hold">
+                                          <p:stCondLst>
+                                            <p:cond delay="0"/>
+                                          </p:stCondLst>
+                                        </p:cTn>
+                                        <p:tgtEl>
+                                          <p:spTgt spid="3">
+                                            <p:txEl>
+                                              <p:pRg st="0" end="0"/>
+                                            </p:txEl>
+                                          </p:spTgt>
+                                        </p:tgtEl>
+                                        <p:attrNameLst>
+                                          <p:attrName>style.visibility</p:attrName>
+                                        </p:attrNameLst>
+                                      </p:cBhvr>
+                                      <p:to>
+                                        <p:strVal val="visible"/>
+                                      </p:to>
+                                    </p:set>
+                                    <p:anim calcmode="lin" valueType="num">
+                                      <p:cBhvr additive="base">
+                                        <p:cTn id="7" dur="500" fill="hold"/>
+                                        <p:tgtEl>
+                                          <p:spTgt spid="3">
+                                            <p:txEl>
+                                              <p:pRg st="0" end="0"/>
+                                            </p:txEl>
+                                          </p:spTgt>
+                                        </p:tgtEl>
+                                        <p:attrNameLst>
+                                          <p:attrName>ppt_x</p:attrName>
+                                        </p:attrNameLst>
+                                      </p:cBhvr>
+                                      <p:tavLst>
+                                        <p:tav tm="0">
+                                          <p:val>
+                                            <p:strVal val="#ppt_x"/>
+                                          </p:val>
+                                        </p:tav>
+                                        <p:tav tm="100000">
+                                          <p:val>
+                                            <p:strVal val="#ppt_x"/>
+                                          </p:val>
+                                        </p:tav>
+                                      </p:tavLst>
+                                    </p:anim>
+                                    <p:anim calcmode="lin" valueType="num">
+                                      <p:cBhvr additive="base">
+                                        <p:cTn id="8" dur="500" fill="hold"/>
+                                        <p:tgtEl>
+                                          <p:spTgt spid="3">
+                                            <p:txEl>
+                                              <p:pRg st="0" end="0"/>
+                                            </p:txEl>
+                                          </p:spTgt>
+                                        </p:tgtEl>
+                                        <p:attrNameLst>
+                                          <p:attrName>ppt_y</p:attrName>
+                                        </p:attrNameLst>
+                                      </p:cBhvr>
+                                      <p:tavLst>
+                                        <p:tav tm="0">
+                                          <p:val>
+                                            <p:strVal val="1+#ppt_h/2"/>
+                                          </p:val>
+                                        </p:tav>
+                                        <p:tav tm="100000">
+                                          <p:val>
+                                            <p:strVal val="#ppt_y"/>
+                                          </p:val>
+                                        </p:tav>
+                                      </p:tavLst>
+                                    </p:anim>
+                                  </p:childTnLst>
+                                </p:cTn>
+                              </p:par>
+                            </p:childTnLst>
+                          </p:cTn>
+                        </p:par>
+                      </p:childTnLst>
+                    </p:cTn>
+                  </p:par>
+                  <p:par>
+                    <p:cTn id="9" fill="hold">
+                      <p:stCondLst>
+                        <p:cond delay="indefinite"/>
+                      </p:stCondLst>
+                      <p:childTnLst>
+                        <p:par>
+                          <p:cTn id="10" fill="hold">
+                            <p:stCondLst>
+                              <p:cond delay="0"/>
+                            </p:stCondLst>
+                            <p:childTnLst>
+                              <p:par>
+                                <p:cTn id="11" presetID="2" presetClass="entr" presetSubtype="4" fill="hold" grpId="0" nodeType="clickEffect">
+                                  <p:stCondLst>
+                                    <p:cond delay="0"/>
+                                  </p:stCondLst>
+                                  <p:childTnLst>
+                                    <p:set>
+                                      <p:cBhvr>
+                                        <p:cTn id="12" dur="1" fill="hold">
+                                          <p:stCondLst>
+                                            <p:cond delay="0"/>
+                                          </p:stCondLst>
+                                        </p:cTn>
+                                        <p:tgtEl>
+                                          <p:spTgt spid="3">
+                                            <p:txEl>
+                                              <p:pRg st="1" end="1"/>
+                                            </p:txEl>
+                                          </p:spTgt>
+                                        </p:tgtEl>
+                                        <p:attrNameLst>
+                                          <p:attrName>style.visibility</p:attrName>
+                                        </p:attrNameLst>
+                                      </p:cBhvr>
+                                      <p:to>
+                                        <p:strVal val="visible"/>
+                                      </p:to>
+                                    </p:set>
+                                    <p:anim calcmode="lin" valueType="num">
+                                      <p:cBhvr additive="base">
+                                        <p:cTn id="13" dur="500" fill="hold"/>
+                                        <p:tgtEl>
+                                          <p:spTgt spid="3">
+                                            <p:txEl>
+                                              <p:pRg st="1" end="1"/>
+                                            </p:txEl>
+                                          </p:spTgt>
+                                        </p:tgtEl>
+                                        <p:attrNameLst>
+                                          <p:attrName>ppt_x</p:attrName>
+                                        </p:attrNameLst>
+                                      </p:cBhvr>
+                                      <p:tavLst>
+                                        <p:tav tm="0">
+                                          <p:val>
+                                            <p:strVal val="#ppt_x"/>
+                                          </p:val>
+                                        </p:tav>
+                                        <p:tav tm="100000">
+                                          <p:val>
+                                            <p:strVal val="#ppt_x"/>
+                                          </p:val>
+                                        </p:tav>
+                                      </p:tavLst>
+                                    </p:anim>
+                                    <p:anim calcmode="lin" valueType="num">
+                                      <p:cBhvr additive="base">
+                                        <p:cTn id="14" dur="500" fill="hold"/>
+                                        <p:tgtEl>
+                                          <p:spTgt spid="3">
+                                            <p:txEl>
+                                              <p:pRg st="1" end="1"/>
+                                            </p:txEl>
+                                          </p:spTgt>
+                                        </p:tgtEl>
+                                        <p:attrNameLst>
+                                          <p:attrName>ppt_y</p:attrName>
+                                        </p:attrNameLst>
+                                      </p:cBhvr>
+                                      <p:tavLst>
+                                        <p:tav tm="0">
+                                          <p:val>
+                                            <p:strVal val="1+#ppt_h/2"/>
+                                          </p:val>
+                                        </p:tav>
+                                        <p:tav tm="100000">
+                                          <p:val>
+                                            <p:strVal val="#ppt_y"/>
+                                          </p:val>
+                                        </p:tav>
+                                      </p:tavLst>
+                                    </p:anim>
+                                  </p:childTnLst>
+                                </p:cTn>
+                              </p:par>
+                            </p:childTnLst>
+                          </p:cTn>
+                        </p:par>
+                      </p:childTnLst>
+                    </p:cTn>
+                  </p:par>
+                  <p:par>
+                    <p:cTn id="15" fill="hold">
+                      <p:stCondLst>
+                        <p:cond delay="indefinite"/>
+                      </p:stCondLst>
+                      <p:childTnLst>
+                        <p:par>
+                          <p:cTn id="16" fill="hold">
+                            <p:stCondLst>
+                              <p:cond delay="0"/>
+                            </p:stCondLst>
+                            <p:childTnLst>
+                              <p:par>
+                                <p:cTn id="17" presetID="2" presetClass="entr" presetSubtype="4" fill="hold" grpId="0" nodeType="clickEffect">
+                                  <p:stCondLst>
+                                    <p:cond delay="0"/>
+                                  </p:stCondLst>
+                                  <p:childTnLst>
+                                    <p:set>
+                                      <p:cBhvr>
+                                        <p:cTn id="18" dur="1" fill="hold">
+                                          <p:stCondLst>
+                                            <p:cond delay="0"/>
+                                          </p:stCondLst>
+                                        </p:cTn>
+                                        <p:tgtEl>
+                                          <p:spTgt spid="3">
+                                            <p:txEl>
+                                              <p:pRg st="2" end="2"/>
+                                            </p:txEl>
+                                          </p:spTgt>
+                                        </p:tgtEl>
+                                        <p:attrNameLst>
+                                          <p:attrName>style.visibility</p:attrName>
+                                        </p:attrNameLst>
+                                      </p:cBhvr>
+                                      <p:to>
+                                        <p:strVal val="visible"/>
+                                      </p:to>
+                                    </p:set>
+                                    <p:anim calcmode="lin" valueType="num">
+                                      <p:cBhvr additive="base">
+                                        <p:cTn id="19" dur="500" fill="hold"/>
+                                        <p:tgtEl>
+                                          <p:spTgt spid="3">
+                                            <p:txEl>
+                                              <p:pRg st="2" end="2"/>
+                                            </p:txEl>
+                                          </p:spTgt>
+                                        </p:tgtEl>
+                                        <p:attrNameLst>
+                                          <p:attrName>ppt_x</p:attrName>
+                                        </p:attrNameLst>
+                                      </p:cBhvr>
+                                      <p:tavLst>
+                                        <p:tav tm="0">
+                                          <p:val>
+                                            <p:strVal val="#ppt_x"/>
+                                          </p:val>
+                                        </p:tav>
+                                        <p:tav tm="100000">
+                                          <p:val>
+                                            <p:strVal val="#ppt_x"/>
+                                          </p:val>
+                                        </p:tav>
+                                      </p:tavLst>
+                                    </p:anim>
+                                    <p:anim calcmode="lin" valueType="num">
+                                      <p:cBhvr additive="base">
+                                        <p:cTn id="20" dur="500" fill="hold"/>
+                                        <p:tgtEl>
+                                          <p:spTgt spid="3">
+                                            <p:txEl>
+                                              <p:pRg st="2" end="2"/>
+                                            </p:txEl>
+                                          </p:spTgt>
+                                        </p:tgtEl>
+                                        <p:attrNameLst>
+                                          <p:attrName>ppt_y</p:attrName>
+                                        </p:attrNameLst>
+                                      </p:cBhvr>
+                                      <p:tavLst>
+                                        <p:tav tm="0">
+                                          <p:val>
+                                            <p:strVal val="1+#ppt_h/2"/>
+                                          </p:val>
+                                        </p:tav>
+                                        <p:tav tm="100000">
+                                          <p:val>
+                                            <p:strVal val="#ppt_y"/>
+                                          </p:val>
+                                        </p:tav>
+                                      </p:tavLst>
+                                    </p:anim>
+                                  </p:childTnLst>
+                                </p:cTn>
+                              </p:par>
+                            </p:childTnLst>
+                          </p:cTn>
+                        </p:par>
+                      </p:childTnLst>
+                    </p:cTn>
+                  </p:par>
+                  <p:par>
+                    <p:cTn id="21" fill="hold">
+                      <p:stCondLst>
+                        <p:cond delay="indefinite"/>
+                      </p:stCondLst>
+                      <p:childTnLst>
+                        <p:par>
+                          <p:cTn id="22" fill="hold">
+                            <p:stCondLst>
+                              <p:cond delay="0"/>
+                            </p:stCondLst>
+                            <p:childTnLst>
+                              <p:par>
+                                <p:cTn id="23" presetID="2" presetClass="entr" presetSubtype="4" fill="hold" grpId="0" nodeType="clickEffect">
+                                  <p:stCondLst>
+                                    <p:cond delay="0"/>
+                                  </p:stCondLst>
+                                  <p:childTnLst>
+                                    <p:set>
+                                      <p:cBhvr>
+                                        <p:cTn id="24" dur="1" fill="hold">
+                                          <p:stCondLst>
+                                            <p:cond delay="0"/>
+                                          </p:stCondLst>
+                                        </p:cTn>
+                                        <p:tgtEl>
+                                          <p:spTgt spid="3">
+                                            <p:txEl>
+                                              <p:pRg st="3" end="3"/>
+                                            </p:txEl>
+                                          </p:spTgt>
+                                        </p:tgtEl>
+                                        <p:attrNameLst>
+                                          <p:attrName>style.visibility</p:attrName>
+                                        </p:attrNameLst>
+                                      </p:cBhvr>
+                                      <p:to>
+                                        <p:strVal val="visible"/>
+                                      </p:to>
+                                    </p:set>
+                                    <p:anim calcmode="lin" valueType="num">
+                                      <p:cBhvr additive="base">
+                                        <p:cTn id="25" dur="500" fill="hold"/>
+                                        <p:tgtEl>
+                                          <p:spTgt spid="3">
+                                            <p:txEl>
+                                              <p:pRg st="3" end="3"/>
+                                            </p:txEl>
+                                          </p:spTgt>
+                                        </p:tgtEl>
+                                        <p:attrNameLst>
+                                          <p:attrName>ppt_x</p:attrName>
+                                        </p:attrNameLst>
+                                      </p:cBhvr>
+                                      <p:tavLst>
+                                        <p:tav tm="0">
+                                          <p:val>
+                                            <p:strVal val="#ppt_x"/>
+                                          </p:val>
+                                        </p:tav>
+                                        <p:tav tm="100000">
+                                          <p:val>
+                                            <p:strVal val="#ppt_x"/>
+                                          </p:val>
+                                        </p:tav>
+                                      </p:tavLst>
+                                    </p:anim>
+                                    <p:anim calcmode="lin" valueType="num">
+                                      <p:cBhvr additive="base">
+                                        <p:cTn id="26" dur="500" fill="hold"/>
+                                        <p:tgtEl>
+                                          <p:spTgt spid="3">
+                                            <p:txEl>
+                                              <p:pRg st="3" end="3"/>
+                                            </p:txEl>
+                                          </p:spTgt>
+                                        </p:tgtEl>
+                                        <p:attrNameLst>
+                                          <p:attrName>ppt_y</p:attrName>
+                                        </p:attrNameLst>
+                                      </p:cBhvr>
+                                      <p:tavLst>
+                                        <p:tav tm="0">
+                                          <p:val>
+                                            <p:strVal val="1+#ppt_h/2"/>
+                                          </p:val>
+                                        </p:tav>
+                                        <p:tav tm="100000">
+                                          <p:val>
+                                            <p:strVal val="#ppt_y"/>
+                                          </p:val>
+                                        </p:tav>
+                                      </p:tavLst>
+                                    </p:anim>
+                                  </p:childTnLst>
+                                </p:cTn>
+                              </p:par>
+                            </p:childTnLst>
+                          </p:cTn>
+                        </p:par>
+                      </p:childTnLst>
+                    </p:cTn>
+                  </p:par>
+                  <p:par>
+                    <p:cTn id="27" fill="hold">
+                      <p:stCondLst>
+                        <p:cond delay="indefinite"/>
+                      </p:stCondLst>
+                      <p:childTnLst>
+                        <p:par>
+                          <p:cTn id="28" fill="hold">
+                            <p:stCondLst>
+                              <p:cond delay="0"/>
+                            </p:stCondLst>
+                            <p:childTnLst>
+                              <p:par>
+                                <p:cTn id="29" presetID="2" presetClass="entr" presetSubtype="4" fill="hold" grpId="0" nodeType="clickEffect">
+                                  <p:stCondLst>
+                                    <p:cond delay="0"/>
+                                  </p:stCondLst>
+                                  <p:childTnLst>
+                                    <p:set>
+                                      <p:cBhvr>
+                                        <p:cTn id="30" dur="1" fill="hold">
+                                          <p:stCondLst>
+                                            <p:cond delay="0"/>
+                                          </p:stCondLst>
+                                        </p:cTn>
+                                        <p:tgtEl>
+                                          <p:spTgt spid="3">
+                                            <p:txEl>
+                                              <p:pRg st="4" end="4"/>
+                                            </p:txEl>
+                                          </p:spTgt>
+                                        </p:tgtEl>
+                                        <p:attrNameLst>
+                                          <p:attrName>style.visibility</p:attrName>
+                                        </p:attrNameLst>
+                                      </p:cBhvr>
+                                      <p:to>
+                                        <p:strVal val="visible"/>
+                                      </p:to>
+                                    </p:set>
+                                    <p:anim calcmode="lin" valueType="num">
+                                      <p:cBhvr additive="base">
+                                        <p:cTn id="31" dur="500" fill="hold"/>
+                                        <p:tgtEl>
+                                          <p:spTgt spid="3">
+                                            <p:txEl>
+                                              <p:pRg st="4" end="4"/>
+                                            </p:txEl>
+                                          </p:spTgt>
+                                        </p:tgtEl>
+                                        <p:attrNameLst>
+                                          <p:attrName>ppt_x</p:attrName>
+                                        </p:attrNameLst>
+                                      </p:cBhvr>
+                                      <p:tavLst>
+                                        <p:tav tm="0">
+                                          <p:val>
+                                            <p:strVal val="#ppt_x"/>
+                                          </p:val>
+                                        </p:tav>
+                                        <p:tav tm="100000">
+                                          <p:val>
+                                            <p:strVal val="#ppt_x"/>
+                                          </p:val>
+                                        </p:tav>
+                                      </p:tavLst>
+                                    </p:anim>
+                                    <p:anim calcmode="lin" valueType="num">
+                                      <p:cBhvr additive="base">
+                                        <p:cTn id="32" dur="500" fill="hold"/>
+                                        <p:tgtEl>
+                                          <p:spTgt spid="3">
+                                            <p:txEl>
+                                              <p:pRg st="4" end="4"/>
+                                            </p:txEl>
+                                          </p:spTgt>
+                                        </p:tgtEl>
+                                        <p:attrNameLst>
+                                          <p:attrName>ppt_y</p:attrName>
+                                        </p:attrNameLst>
+                                      </p:cBhvr>
+                                      <p:tavLst>
+                                        <p:tav tm="0">
+                                          <p:val>
+                                            <p:strVal val="1+#ppt_h/2"/>
+                                          </p:val>
+                                        </p:tav>
+                                        <p:tav tm="100000">
+                                          <p:val>
+                                            <p:strVal val="#ppt_y"/>
+                                          </p:val>
+                                        </p:tav>
+                                      </p:tavLst>
+                                    </p:anim>
+                                  </p:childTnLst>
+                                </p:cTn>
+                              </p:par>
+                            </p:childTnLst>
+                          </p:cTn>
+                        </p:par>
+                      </p:childTnLst>
+                    </p:cTn>
+                  </p:par>
+                  <p:par>
+                    <p:cTn id="33" fill="hold">
+                      <p:stCondLst>
+                        <p:cond delay="indefinite"/>
+                      </p:stCondLst>
+                      <p:childTnLst>
+                        <p:par>
+                          <p:cTn id="34" fill="hold">
+                            <p:stCondLst>
+                              <p:cond delay="0"/>
+                            </p:stCondLst>
+                            <p:childTnLst>
+                              <p:par>
+                                <p:cTn id="35" presetID="2" presetClass="entr" presetSubtype="4" fill="hold" grpId="0" nodeType="clickEffect">
+                                  <p:stCondLst>
+                                    <p:cond delay="0"/>
+                                  </p:stCondLst>
+                                  <p:childTnLst>
+                                    <p:set>
+                                      <p:cBhvr>
+                                        <p:cTn id="36" dur="1" fill="hold">
+                                          <p:stCondLst>
+                                            <p:cond delay="0"/>
+                                          </p:stCondLst>
+                                        </p:cTn>
+                                        <p:tgtEl>
+                                          <p:spTgt spid="3">
+                                            <p:txEl>
+                                              <p:pRg st="5" end="5"/>
+                                            </p:txEl>
+                                          </p:spTgt>
+                                        </p:tgtEl>
+                                        <p:attrNameLst>
+                                          <p:attrName>style.visibility</p:attrName>
+                                        </p:attrNameLst>
+                                      </p:cBhvr>
+                                      <p:to>
+                                        <p:strVal val="visible"/>
+                                      </p:to>
+                                    </p:set>
+                                    <p:anim calcmode="lin" valueType="num">
+                                      <p:cBhvr additive="base">
+                                        <p:cTn id="37" dur="500" fill="hold"/>
+                                        <p:tgtEl>
+                                          <p:spTgt spid="3">
+                                            <p:txEl>
+                                              <p:pRg st="5" end="5"/>
+                                            </p:txEl>
+                                          </p:spTgt>
+                                        </p:tgtEl>
+                                        <p:attrNameLst>
+                                          <p:attrName>ppt_x</p:attrName>
+                                        </p:attrNameLst>
+                                      </p:cBhvr>
+                                      <p:tavLst>
+                                        <p:tav tm="0">
+                                          <p:val>
+                                            <p:strVal val="#ppt_x"/>
+                                          </p:val>
+                                        </p:tav>
+                                        <p:tav tm="100000">
+                                          <p:val>
+                                            <p:strVal val="#ppt_x"/>
+                                          </p:val>
+                                        </p:tav>
+                                      </p:tavLst>
+                                    </p:anim>
+                                    <p:anim calcmode="lin" valueType="num">
+                                      <p:cBhvr additive="base">
+                                        <p:cTn id="38" dur="500" fill="hold"/>
+                                        <p:tgtEl>
+                                          <p:spTgt spid="3">
+                                            <p:txEl>
+                                              <p:pRg st="5" end="5"/>
+                                            </p:txEl>
+                                          </p:spTgt>
+                                        </p:tgtEl>
+                                        <p:attrNameLst>
+                                          <p:attrName>ppt_y</p:attrName>
+                                        </p:attrNameLst>
+                                      </p:cBhvr>
+                                      <p:tavLst>
+                                        <p:tav tm="0">
+                                          <p:val>
+                                            <p:strVal val="1+#ppt_h/2"/>
+                                          </p:val>
+                                        </p:tav>
+                                        <p:tav tm="100000">
+                                          <p:val>
+                                            <p:strVal val="#ppt_y"/>
+                                          </p:val>
+                                        </p:tav>
+                                      </p:tavLst>
+                                    </p:anim>
+                                  </p:childTnLst>
+                                </p:cTn>
+                              </p:par>
+                            </p:childTnLst>
+                          </p:cTn>
+                        </p:par>
+                      </p:childTnLst>
+                    </p:cTn>
+                  </p:par>
+                  <p:par>
+                    <p:cTn id="39" fill="hold">
+                      <p:stCondLst>
+                        <p:cond delay="indefinite"/>
+                      </p:stCondLst>
+                      <p:childTnLst>
+                        <p:par>
+                          <p:cTn id="40" fill="hold">
+                            <p:stCondLst>
+                              <p:cond delay="0"/>
+                            </p:stCondLst>
+                            <p:childTnLst>
+                              <p:par>
+                                <p:cTn id="41" presetID="2" presetClass="entr" presetSubtype="4" fill="hold" grpId="0" nodeType="clickEffect">
+                                  <p:stCondLst>
+                                    <p:cond delay="0"/>
+                                  </p:stCondLst>
+                                  <p:childTnLst>
+                                    <p:set>
+                                      <p:cBhvr>
+                                        <p:cTn id="42" dur="1" fill="hold">
+                                          <p:stCondLst>
+                                            <p:cond delay="0"/>
+                                          </p:stCondLst>
+                                        </p:cTn>
+                                        <p:tgtEl>
+                                          <p:spTgt spid="3">
+                                            <p:txEl>
+                                              <p:pRg st="6" end="6"/>
+                                            </p:txEl>
+                                          </p:spTgt>
+                                        </p:tgtEl>
+                                        <p:attrNameLst>
+                                          <p:attrName>style.visibility</p:attrName>
+                                        </p:attrNameLst>
+                                      </p:cBhvr>
+                                      <p:to>
+                                        <p:strVal val="visible"/>
+                                      </p:to>
+                                    </p:set>
+                                    <p:anim calcmode="lin" valueType="num">
+                                      <p:cBhvr additive="base">
+                                        <p:cTn id="43" dur="500" fill="hold"/>
+                                        <p:tgtEl>
+                                          <p:spTgt spid="3">
+                                            <p:txEl>
+                                              <p:pRg st="6" end="6"/>
+                                            </p:txEl>
+                                          </p:spTgt>
+                                        </p:tgtEl>
+                                        <p:attrNameLst>
+                                          <p:attrName>ppt_x</p:attrName>
+                                        </p:attrNameLst>
+                                      </p:cBhvr>
+                                      <p:tavLst>
+                                        <p:tav tm="0">
+                                          <p:val>
+                                            <p:strVal val="#ppt_x"/>
+                                          </p:val>
+                                        </p:tav>
+                                        <p:tav tm="100000">
+                                          <p:val>
+                                            <p:strVal val="#ppt_x"/>
+                                          </p:val>
+                                        </p:tav>
+                                      </p:tavLst>
+                                    </p:anim>
+                                    <p:anim calcmode="lin" valueType="num">
+                                      <p:cBhvr additive="base">
+                                        <p:cTn id="44" dur="500" fill="hold"/>
+                                        <p:tgtEl>
+                                          <p:spTgt spid="3">
+                                            <p:txEl>
+                                              <p:pRg st="6" end="6"/>
+                                            </p:txEl>
+                                          </p:spTgt>
+                                        </p:tgtEl>
+                                        <p:attrNameLst>
+                                          <p:attrName>ppt_y</p:attrName>
+                                        </p:attrNameLst>
+                                      </p:cBhvr>
+                                      <p:tavLst>
+                                        <p:tav tm="0">
+                                          <p:val>
+                                            <p:strVal val="1+#ppt_h/2"/>
+                                          </p:val>
+                                        </p:tav>
+                                        <p:tav tm="100000">
+                                          <p:val>
+                                            <p:strVal val="#ppt_y"/>
+                                          </p:val>
+                                        </p:tav>
+                                      </p:tavLst>
+                                    </p:anim>
+                                  </p:childTnLst>
+                                </p:cTn>
+                              </p:par>
+                            </p:childTnLst>
+                          </p:cTn>
+                        </p:par>
+                      </p:childTnLst>
+                    </p:cTn>
+                  </p:par>
+                  <p:par>
+                    <p:cTn id="45" fill="hold">
+                      <p:stCondLst>
+                        <p:cond delay="indefinite"/>
+                      </p:stCondLst>
+                      <p:childTnLst>
+                        <p:par>
+                          <p:cTn id="46" fill="hold">
+                            <p:stCondLst>
+                              <p:cond delay="0"/>
+                            </p:stCondLst>
+                            <p:childTnLst>
+                              <p:par>
+                                <p:cTn id="47" presetID="2" presetClass="entr" presetSubtype="4" fill="hold" grpId="0" nodeType="clickEffect">
+                                  <p:stCondLst>
+                                    <p:cond delay="0"/>
+                                  </p:stCondLst>
+                                  <p:childTnLst>
+                                    <p:set>
+                                      <p:cBhvr>
+                                        <p:cTn id="48" dur="1" fill="hold">
+                                          <p:stCondLst>
+                                            <p:cond delay="0"/>
+                                          </p:stCondLst>
+                                        </p:cTn>
+                                        <p:tgtEl>
+                                          <p:spTgt spid="3">
+                                            <p:txEl>
+                                              <p:pRg st="7" end="7"/>
+                                            </p:txEl>
+                                          </p:spTgt>
+                                        </p:tgtEl>
+                                        <p:attrNameLst>
+                                          <p:attrName>style.visibility</p:attrName>
+                                        </p:attrNameLst>
+                                      </p:cBhvr>
+                                      <p:to>
+                                        <p:strVal val="visible"/>
+                                      </p:to>
+                                    </p:set>
+                                    <p:anim calcmode="lin" valueType="num">
+                                      <p:cBhvr additive="base">
+                                        <p:cTn id="49" dur="500" fill="hold"/>
+                                        <p:tgtEl>
+                                          <p:spTgt spid="3">
+                                            <p:txEl>
+                                              <p:pRg st="7" end="7"/>
+                                            </p:txEl>
+                                          </p:spTgt>
+                                        </p:tgtEl>
+                                        <p:attrNameLst>
+                                          <p:attrName>ppt_x</p:attrName>
+                                        </p:attrNameLst>
+                                      </p:cBhvr>
+                                      <p:tavLst>
+                                        <p:tav tm="0">
+                                          <p:val>
+                                            <p:strVal val="#ppt_x"/>
+                                          </p:val>
+                                        </p:tav>
+                                        <p:tav tm="100000">
+                                          <p:val>
+                                            <p:strVal val="#ppt_x"/>
+                                          </p:val>
+                                        </p:tav>
+                                      </p:tavLst>
+                                    </p:anim>
+                                    <p:anim calcmode="lin" valueType="num">
+                                      <p:cBhvr additive="base">
+                                        <p:cTn id="50" dur="500" fill="hold"/>
+                                        <p:tgtEl>
+                                          <p:spTgt spid="3">
+                                            <p:txEl>
+                                              <p:pRg st="7" end="7"/>
+                                            </p:txEl>
+                                          </p:spTgt>
+                                        </p:tgtEl>
+                                        <p:attrNameLst>
+                                          <p:attrName>ppt_y</p:attrName>
+                                        </p:attrNameLst>
+                                      </p:cBhvr>
+                                      <p:tavLst>
+                                        <p:tav tm="0">
+                                          <p:val>
+                                            <p:strVal val="1+#ppt_h/2"/>
+                                          </p:val>
+                                        </p:tav>
+                                        <p:tav tm="100000">
+                                          <p:val>
+                                            <p:strVal val="#ppt_y"/>
+                                          </p:val>
+                                        </p:tav>
+                                      </p:tavLst>
+                                    </p:anim>
+                                  </p:childTnLst>
+                                </p:cTn>
+                              </p:par>
+                            </p:childTnLst>
+                          </p:cTn>
+                        </p:par>
+                      </p:childTnLst>
+                    </p:cTn>
+                  </p:par>
+                </p:childTnLst>
+              </p:cTn>
+              <p:prevCondLst>
+                <p:cond evt="onPrev" delay="0">
+                  <p:tgtEl>
+                    <p:sldTgt/>
+                  </p:tgtEl>
+                </p:cond>
+              </p:prevCondLst>
+              <p:nextCondLst>
+                <p:cond evt="onNext" delay="0">
+                  <p:tgtEl>
+                    <p:sldTgt/>
+                  </p:tgtEl>
+                </p:cond>
+              </p:nextCondLst>
+            </p:seq>
+          </p:childTnLst>
+        </p:cTn>
+      </p:par>
+    </p:tnLst>
+    <p:bldLst>
+      <p:bldP spid="3" grpId="0" uiExpand="1" build="p"/>
+    </p:bldLst>
+  </p:timing>
+</p:sld>
+</file>
+
+<file path=ppt/slides/slide14.xml><?xml version="1.0" encoding="utf-8"?>
+<p:sld xmlns:a="http://schemas.openxmlformats.org/drawingml/2006/main" xmlns:r="http://schemas.openxmlformats.org/officeDocument/2006/relationships" xmlns:p="http://schemas.openxmlformats.org/presentationml/2006/main">
+  <p:cSld>
+    <p:spTree>
+      <p:nvGrpSpPr>
+        <p:cNvPr id="1" name=""/>
+        <p:cNvGrpSpPr/>
+        <p:nvPr/>
+      </p:nvGrpSpPr>
+      <p:grpSpPr>
+        <a:xfrm>
+          <a:off x="0" y="0"/>
+          <a:ext cx="0" cy="0"/>
+          <a:chOff x="0" y="0"/>
+          <a:chExt cx="0" cy="0"/>
+        </a:xfrm>
+      </p:grpSpPr>
+      <p:sp>
+        <p:nvSpPr>
+          <p:cNvPr id="2" name="Title 1">
+            <a:extLst>
+              <a:ext uri="{FF2B5EF4-FFF2-40B4-BE49-F238E27FC236}">
+                <a16:creationId xmlns:a16="http://schemas.microsoft.com/office/drawing/2014/main" id="{E03281FC-7210-4ED9-9307-58A3CE63E058}"/>
+              </a:ext>
+            </a:extLst>
+          </p:cNvPr>
+          <p:cNvSpPr>
+            <a:spLocks noGrp="1"/>
+          </p:cNvSpPr>
+          <p:nvPr>
+            <p:ph type="title"/>
+          </p:nvPr>
+        </p:nvSpPr>
+        <p:spPr/>
+        <p:txBody>
+          <a:bodyPr/>
+          <a:lstStyle/>
+          <a:p>
+            <a:r>
+              <a:rPr lang="en-US" dirty="0"/>
+              <a:t>Message Format: </a:t>
+            </a:r>
+            <a:r>
+              <a:rPr lang="en-US" dirty="0" err="1"/>
+              <a:t>ToString</a:t>
+            </a:r>
+            <a:r>
+              <a:rPr lang="en-US" dirty="0"/>
+              <a:t>() vs Dump</a:t>
+            </a:r>
+          </a:p>
+        </p:txBody>
+      </p:sp>
+      <p:sp>
+        <p:nvSpPr>
+          <p:cNvPr id="3" name="Content Placeholder 2">
+            <a:extLst>
+              <a:ext uri="{FF2B5EF4-FFF2-40B4-BE49-F238E27FC236}">
+                <a16:creationId xmlns:a16="http://schemas.microsoft.com/office/drawing/2014/main" id="{820D962F-E825-4961-890B-5E3849C17450}"/>
+              </a:ext>
+            </a:extLst>
+          </p:cNvPr>
+          <p:cNvSpPr>
+            <a:spLocks noGrp="1"/>
+          </p:cNvSpPr>
+          <p:nvPr>
+            <p:ph idx="1"/>
+          </p:nvPr>
+        </p:nvSpPr>
+        <p:spPr/>
+        <p:txBody>
+          <a:bodyPr/>
+          <a:lstStyle/>
+          <a:p>
+            <a:r>
+              <a:rPr lang="fr-FR" dirty="0"/>
+              <a:t>_</a:t>
+            </a:r>
+            <a:r>
+              <a:rPr lang="fr-FR" dirty="0" err="1"/>
+              <a:t>logger.LogInformation</a:t>
+            </a:r>
+            <a:r>
+              <a:rPr lang="fr-FR" dirty="0"/>
+              <a:t>("User Information {User}", </a:t>
+            </a:r>
+            <a:r>
+              <a:rPr lang="fr-FR" dirty="0" err="1"/>
+              <a:t>Request</a:t>
+            </a:r>
+            <a:r>
+              <a:rPr lang="fr-FR" dirty="0"/>
+              <a:t>);</a:t>
+            </a:r>
+          </a:p>
+          <a:p>
+            <a:pPr lvl="1"/>
+            <a:r>
+              <a:rPr lang="fr-FR" dirty="0"/>
+              <a:t>[10:49:27 acd7bc9a-669d-4af5-9d4d-530b65966ef4 INF] User Information </a:t>
+            </a:r>
+            <a:r>
+              <a:rPr lang="fr-FR" dirty="0" err="1"/>
+              <a:t>Microsoft.AspNetCore.Http.DefaultHttpRequest</a:t>
+            </a:r>
+            <a:endParaRPr lang="fr-FR" dirty="0"/>
+          </a:p>
+          <a:p>
+            <a:r>
+              <a:rPr lang="en-US" dirty="0"/>
+              <a:t>_</a:t>
+            </a:r>
+            <a:r>
+              <a:rPr lang="en-US" dirty="0" err="1"/>
+              <a:t>logger.LogInformation</a:t>
+            </a:r>
+            <a:r>
+              <a:rPr lang="en-US" dirty="0"/>
+              <a:t>("Full User Identity Details {@User}", </a:t>
+            </a:r>
+            <a:r>
+              <a:rPr lang="en-US" dirty="0" err="1"/>
+              <a:t>User.Identity</a:t>
+            </a:r>
+            <a:r>
+              <a:rPr lang="en-US" dirty="0"/>
+              <a:t>);</a:t>
+            </a:r>
+          </a:p>
+          <a:p>
+            <a:pPr lvl="1"/>
+            <a:r>
+              <a:rPr lang="en-US" dirty="0"/>
+              <a:t>[10:49:27 acd7bc9a-669d-4af5-9d4d-530b65966ef4 INF] Full User Identity Details {"AuthenticationType":null,"IsAuthenticated":false,"Actor":null,"BootstrapContext":null,"Claims":[],"Label“….</a:t>
+            </a:r>
+          </a:p>
+        </p:txBody>
+      </p:sp>
+    </p:spTree>
+    <p:extLst>
+      <p:ext uri="{BB962C8B-B14F-4D97-AF65-F5344CB8AC3E}">
+        <p14:creationId xmlns:p14="http://schemas.microsoft.com/office/powerpoint/2010/main" val="2125271925"/>
+      </p:ext>
+    </p:extLst>
+  </p:cSld>
+  <p:clrMapOvr>
+    <a:masterClrMapping/>
+  </p:clrMapOvr>
+  <p:timing>
+    <p:tnLst>
+      <p:par>
+        <p:cTn id="1" dur="indefinite" restart="never" nodeType="tmRoot">
+          <p:childTnLst>
+            <p:seq concurrent="1" nextAc="seek">
+              <p:cTn id="2" dur="indefinite" nodeType="mainSeq">
+                <p:childTnLst>
+                  <p:par>
+                    <p:cTn id="3" fill="hold">
+                      <p:stCondLst>
+                        <p:cond delay="indefinite"/>
+                        <p:cond evt="onBegin" delay="0">
+                          <p:tn val="2"/>
+                        </p:cond>
+                      </p:stCondLst>
+                      <p:childTnLst>
+                        <p:par>
+                          <p:cTn id="4" fill="hold">
+                            <p:stCondLst>
+                              <p:cond delay="0"/>
+                            </p:stCondLst>
+                            <p:childTnLst>
+                              <p:par>
+                                <p:cTn id="5" presetID="1" presetClass="entr" presetSubtype="0" fill="hold" grpId="0" nodeType="withEffect">
+                                  <p:stCondLst>
+                                    <p:cond delay="0"/>
+                                  </p:stCondLst>
+                                  <p:childTnLst>
+                                    <p:set>
+                                      <p:cBhvr>
+                                        <p:cTn id="6" dur="1" fill="hold">
+                                          <p:stCondLst>
+                                            <p:cond delay="0"/>
+                                          </p:stCondLst>
+                                        </p:cTn>
+                                        <p:tgtEl>
+                                          <p:spTgt spid="3">
+                                            <p:txEl>
+                                              <p:pRg st="0" end="0"/>
+                                            </p:txEl>
+                                          </p:spTgt>
+                                        </p:tgtEl>
+                                        <p:attrNameLst>
+                                          <p:attrName>style.visibility</p:attrName>
+                                        </p:attrNameLst>
+                                      </p:cBhvr>
+                                      <p:to>
+                                        <p:strVal val="visible"/>
+                                      </p:to>
+                                    </p:set>
+                                  </p:childTnLst>
+                                </p:cTn>
+                              </p:par>
+                            </p:childTnLst>
+                          </p:cTn>
+                        </p:par>
+                      </p:childTnLst>
+                    </p:cTn>
+                  </p:par>
+                  <p:par>
+                    <p:cTn id="7" fill="hold">
+                      <p:stCondLst>
+                        <p:cond delay="indefinite"/>
+                      </p:stCondLst>
+                      <p:childTnLst>
+                        <p:par>
+                          <p:cTn id="8" fill="hold">
+                            <p:stCondLst>
+                              <p:cond delay="0"/>
+                            </p:stCondLst>
+                            <p:childTnLst>
+                              <p:par>
+                                <p:cTn id="9" presetID="1" presetClass="entr" presetSubtype="0" fill="hold" grpId="0" nodeType="clickEffect">
+                                  <p:stCondLst>
+                                    <p:cond delay="0"/>
+                                  </p:stCondLst>
+                                  <p:childTnLst>
+                                    <p:set>
+                                      <p:cBhvr>
+                                        <p:cTn id="10" dur="1" fill="hold">
+                                          <p:stCondLst>
+                                            <p:cond delay="0"/>
+                                          </p:stCondLst>
+                                        </p:cTn>
+                                        <p:tgtEl>
+                                          <p:spTgt spid="3">
+                                            <p:txEl>
+                                              <p:pRg st="1" end="1"/>
+                                            </p:txEl>
+                                          </p:spTgt>
+                                        </p:tgtEl>
+                                        <p:attrNameLst>
+                                          <p:attrName>style.visibility</p:attrName>
+                                        </p:attrNameLst>
+                                      </p:cBhvr>
+                                      <p:to>
+                                        <p:strVal val="visible"/>
+                                      </p:to>
+                                    </p:set>
+                                  </p:childTnLst>
+                                </p:cTn>
+                              </p:par>
+                            </p:childTnLst>
+                          </p:cTn>
+                        </p:par>
+                      </p:childTnLst>
+                    </p:cTn>
+                  </p:par>
+                  <p:par>
+                    <p:cTn id="11" fill="hold">
+                      <p:stCondLst>
+                        <p:cond delay="indefinite"/>
+                      </p:stCondLst>
+                      <p:childTnLst>
+                        <p:par>
+                          <p:cTn id="12" fill="hold">
+                            <p:stCondLst>
+                              <p:cond delay="0"/>
+                            </p:stCondLst>
+                            <p:childTnLst>
+                              <p:par>
+                                <p:cTn id="13" presetID="1" presetClass="entr" presetSubtype="0" fill="hold" grpId="0" nodeType="clickEffect">
+                                  <p:stCondLst>
+                                    <p:cond delay="0"/>
+                                  </p:stCondLst>
+                                  <p:childTnLst>
+                                    <p:set>
+                                      <p:cBhvr>
+                                        <p:cTn id="14" dur="1" fill="hold">
+                                          <p:stCondLst>
+                                            <p:cond delay="0"/>
+                                          </p:stCondLst>
+                                        </p:cTn>
+                                        <p:tgtEl>
+                                          <p:spTgt spid="3">
+                                            <p:txEl>
+                                              <p:pRg st="2" end="2"/>
+                                            </p:txEl>
+                                          </p:spTgt>
+                                        </p:tgtEl>
+                                        <p:attrNameLst>
+                                          <p:attrName>style.visibility</p:attrName>
+                                        </p:attrNameLst>
+                                      </p:cBhvr>
+                                      <p:to>
+                                        <p:strVal val="visible"/>
+                                      </p:to>
+                                    </p:set>
+                                  </p:childTnLst>
+                                </p:cTn>
+                              </p:par>
+                            </p:childTnLst>
+                          </p:cTn>
+                        </p:par>
+                      </p:childTnLst>
+                    </p:cTn>
+                  </p:par>
+                  <p:par>
+                    <p:cTn id="15" fill="hold">
+                      <p:stCondLst>
+                        <p:cond delay="indefinite"/>
+                      </p:stCondLst>
+                      <p:childTnLst>
+                        <p:par>
+                          <p:cTn id="16" fill="hold">
+                            <p:stCondLst>
+                              <p:cond delay="0"/>
+                            </p:stCondLst>
+                            <p:childTnLst>
+                              <p:par>
+                                <p:cTn id="17" presetID="1" presetClass="entr" presetSubtype="0" fill="hold" grpId="0" nodeType="clickEffect">
+                                  <p:stCondLst>
+                                    <p:cond delay="0"/>
+                                  </p:stCondLst>
+                                  <p:childTnLst>
+                                    <p:set>
+                                      <p:cBhvr>
+                                        <p:cTn id="18" dur="1" fill="hold">
+                                          <p:stCondLst>
+                                            <p:cond delay="0"/>
+                                          </p:stCondLst>
+                                        </p:cTn>
+                                        <p:tgtEl>
+                                          <p:spTgt spid="3">
+                                            <p:txEl>
+                                              <p:pRg st="3" end="3"/>
+                                            </p:txEl>
+                                          </p:spTgt>
+                                        </p:tgtEl>
+                                        <p:attrNameLst>
+                                          <p:attrName>style.visibility</p:attrName>
+                                        </p:attrNameLst>
+                                      </p:cBhvr>
+                                      <p:to>
+                                        <p:strVal val="visible"/>
+                                      </p:to>
+                                    </p:set>
+                                  </p:childTnLst>
+                                </p:cTn>
+                              </p:par>
+                            </p:childTnLst>
+                          </p:cTn>
+                        </p:par>
+                      </p:childTnLst>
+                    </p:cTn>
+                  </p:par>
+                </p:childTnLst>
+              </p:cTn>
+              <p:prevCondLst>
+                <p:cond evt="onPrev" delay="0">
+                  <p:tgtEl>
+                    <p:sldTgt/>
+                  </p:tgtEl>
+                </p:cond>
+              </p:prevCondLst>
+              <p:nextCondLst>
+                <p:cond evt="onNext" delay="0">
+                  <p:tgtEl>
+                    <p:sldTgt/>
+                  </p:tgtEl>
+                </p:cond>
+              </p:nextCondLst>
+            </p:seq>
+          </p:childTnLst>
+        </p:cTn>
+      </p:par>
+    </p:tnLst>
+    <p:bldLst>
+      <p:bldP spid="3" grpId="0" uiExpand="1" build="p"/>
+    </p:bldLst>
+  </p:timing>
+</p:sld>
+</file>
+
 <file path=ppt/slides/slide15.xml><?xml version="1.0" encoding="utf-8"?>
 <p:sld xmlns:a="http://schemas.openxmlformats.org/drawingml/2006/main" xmlns:r="http://schemas.openxmlformats.org/officeDocument/2006/relationships" xmlns:p="http://schemas.openxmlformats.org/presentationml/2006/main">
   <p:cSld>
@@ -9428,7 +10317,7 @@
           <a:p>
             <a:r>
               <a:rPr lang="en-US" dirty="0"/>
-              <a:t>Escalation Protocols – Who Do We Tell?</a:t>
+              <a:t>Escalation Protocols – Telling Someone!</a:t>
             </a:r>
           </a:p>
         </p:txBody>

</xml_diff>